<commit_message>
GEE added to clay
</commit_message>
<xml_diff>
--- a/Coastal Threat Alert System.pptx
+++ b/Coastal Threat Alert System.pptx
@@ -19,11 +19,11 @@
     <p:sldId id="397" r:id="rId10"/>
     <p:sldId id="408" r:id="rId11"/>
     <p:sldId id="407" r:id="rId12"/>
-    <p:sldId id="404" r:id="rId13"/>
-    <p:sldId id="406" r:id="rId14"/>
+    <p:sldId id="415" r:id="rId13"/>
+    <p:sldId id="416" r:id="rId14"/>
     <p:sldId id="405" r:id="rId15"/>
     <p:sldId id="411" r:id="rId16"/>
-    <p:sldId id="412" r:id="rId17"/>
+    <p:sldId id="417" r:id="rId17"/>
     <p:sldId id="413" r:id="rId18"/>
     <p:sldId id="398" r:id="rId19"/>
   </p:sldIdLst>
@@ -774,174 +774,6 @@
   <p:cSld>
     <p:spTree>
       <p:nvGrpSpPr>
-        <p:cNvPr id="1" name=""/>
-        <p:cNvGrpSpPr/>
-        <p:nvPr/>
-      </p:nvGrpSpPr>
-      <p:grpSpPr>
-        <a:xfrm>
-          <a:off x="0" y="0"/>
-          <a:ext cx="0" cy="0"/>
-          <a:chOff x="0" y="0"/>
-          <a:chExt cx="0" cy="0"/>
-        </a:xfrm>
-      </p:grpSpPr>
-      <p:sp>
-        <p:nvSpPr>
-          <p:cNvPr id="2" name="Slide Image Placeholder 1"/>
-          <p:cNvSpPr>
-            <a:spLocks noGrp="1" noRot="1" noChangeAspect="1"/>
-          </p:cNvSpPr>
-          <p:nvPr>
-            <p:ph type="sldImg"/>
-          </p:nvPr>
-        </p:nvSpPr>
-        <p:spPr/>
-      </p:sp>
-      <p:sp>
-        <p:nvSpPr>
-          <p:cNvPr id="3" name="Notes Placeholder 2"/>
-          <p:cNvSpPr>
-            <a:spLocks noGrp="1"/>
-          </p:cNvSpPr>
-          <p:nvPr>
-            <p:ph type="body" idx="1"/>
-          </p:nvPr>
-        </p:nvSpPr>
-        <p:spPr/>
-        <p:txBody>
-          <a:bodyPr/>
-          <a:lstStyle/>
-          <a:p>
-            <a:endParaRPr lang="en-US" dirty="0"/>
-          </a:p>
-        </p:txBody>
-      </p:sp>
-      <p:sp>
-        <p:nvSpPr>
-          <p:cNvPr id="4" name="Slide Number Placeholder 3"/>
-          <p:cNvSpPr>
-            <a:spLocks noGrp="1"/>
-          </p:cNvSpPr>
-          <p:nvPr>
-            <p:ph type="sldNum" sz="quarter" idx="5"/>
-          </p:nvPr>
-        </p:nvSpPr>
-        <p:spPr/>
-        <p:txBody>
-          <a:bodyPr/>
-          <a:lstStyle/>
-          <a:p>
-            <a:fld id="{A89C7E07-3C67-C64C-8DA0-0404F6303970}" type="slidenum">
-              <a:rPr lang="en-US" smtClean="0"/>
-              <a:t>10</a:t>
-            </a:fld>
-            <a:endParaRPr lang="en-US" dirty="0"/>
-          </a:p>
-        </p:txBody>
-      </p:sp>
-    </p:spTree>
-    <p:extLst>
-      <p:ext uri="{BB962C8B-B14F-4D97-AF65-F5344CB8AC3E}">
-        <p14:creationId xmlns:p14="http://schemas.microsoft.com/office/powerpoint/2010/main" val="2994759380"/>
-      </p:ext>
-    </p:extLst>
-  </p:cSld>
-  <p:clrMapOvr>
-    <a:masterClrMapping/>
-  </p:clrMapOvr>
-</p:notes>
-</file>
-
-<file path=ppt/notesSlides/notesSlide11.xml><?xml version="1.0" encoding="utf-8"?>
-<p:notes xmlns:a="http://schemas.openxmlformats.org/drawingml/2006/main" xmlns:r="http://schemas.openxmlformats.org/officeDocument/2006/relationships" xmlns:p="http://schemas.openxmlformats.org/presentationml/2006/main">
-  <p:cSld>
-    <p:spTree>
-      <p:nvGrpSpPr>
-        <p:cNvPr id="1" name=""/>
-        <p:cNvGrpSpPr/>
-        <p:nvPr/>
-      </p:nvGrpSpPr>
-      <p:grpSpPr>
-        <a:xfrm>
-          <a:off x="0" y="0"/>
-          <a:ext cx="0" cy="0"/>
-          <a:chOff x="0" y="0"/>
-          <a:chExt cx="0" cy="0"/>
-        </a:xfrm>
-      </p:grpSpPr>
-      <p:sp>
-        <p:nvSpPr>
-          <p:cNvPr id="2" name="Slide Image Placeholder 1"/>
-          <p:cNvSpPr>
-            <a:spLocks noGrp="1" noRot="1" noChangeAspect="1"/>
-          </p:cNvSpPr>
-          <p:nvPr>
-            <p:ph type="sldImg"/>
-          </p:nvPr>
-        </p:nvSpPr>
-        <p:spPr/>
-      </p:sp>
-      <p:sp>
-        <p:nvSpPr>
-          <p:cNvPr id="3" name="Notes Placeholder 2"/>
-          <p:cNvSpPr>
-            <a:spLocks noGrp="1"/>
-          </p:cNvSpPr>
-          <p:nvPr>
-            <p:ph type="body" idx="1"/>
-          </p:nvPr>
-        </p:nvSpPr>
-        <p:spPr/>
-        <p:txBody>
-          <a:bodyPr/>
-          <a:lstStyle/>
-          <a:p>
-            <a:endParaRPr lang="en-US" dirty="0"/>
-          </a:p>
-        </p:txBody>
-      </p:sp>
-      <p:sp>
-        <p:nvSpPr>
-          <p:cNvPr id="4" name="Slide Number Placeholder 3"/>
-          <p:cNvSpPr>
-            <a:spLocks noGrp="1"/>
-          </p:cNvSpPr>
-          <p:nvPr>
-            <p:ph type="sldNum" sz="quarter" idx="5"/>
-          </p:nvPr>
-        </p:nvSpPr>
-        <p:spPr/>
-        <p:txBody>
-          <a:bodyPr/>
-          <a:lstStyle/>
-          <a:p>
-            <a:fld id="{A89C7E07-3C67-C64C-8DA0-0404F6303970}" type="slidenum">
-              <a:rPr lang="en-US" smtClean="0"/>
-              <a:t>11</a:t>
-            </a:fld>
-            <a:endParaRPr lang="en-US" dirty="0"/>
-          </a:p>
-        </p:txBody>
-      </p:sp>
-    </p:spTree>
-    <p:extLst>
-      <p:ext uri="{BB962C8B-B14F-4D97-AF65-F5344CB8AC3E}">
-        <p14:creationId xmlns:p14="http://schemas.microsoft.com/office/powerpoint/2010/main" val="4050233131"/>
-      </p:ext>
-    </p:extLst>
-  </p:cSld>
-  <p:clrMapOvr>
-    <a:masterClrMapping/>
-  </p:clrMapOvr>
-</p:notes>
-</file>
-
-<file path=ppt/notesSlides/notesSlide12.xml><?xml version="1.0" encoding="utf-8"?>
-<p:notes xmlns:a="http://schemas.openxmlformats.org/drawingml/2006/main" xmlns:r="http://schemas.openxmlformats.org/officeDocument/2006/relationships" xmlns:p="http://schemas.openxmlformats.org/presentationml/2006/main">
-  <p:cSld>
-    <p:spTree>
-      <p:nvGrpSpPr>
         <p:cNvPr id="1" name="">
           <a:extLst>
             <a:ext uri="{FF2B5EF4-FFF2-40B4-BE49-F238E27FC236}">
@@ -1045,115 +877,7 @@
 </p:notes>
 </file>
 
-<file path=ppt/notesSlides/notesSlide13.xml><?xml version="1.0" encoding="utf-8"?>
-<p:notes xmlns:a="http://schemas.openxmlformats.org/drawingml/2006/main" xmlns:r="http://schemas.openxmlformats.org/officeDocument/2006/relationships" xmlns:p="http://schemas.openxmlformats.org/presentationml/2006/main">
-  <p:cSld>
-    <p:spTree>
-      <p:nvGrpSpPr>
-        <p:cNvPr id="1" name="">
-          <a:extLst>
-            <a:ext uri="{FF2B5EF4-FFF2-40B4-BE49-F238E27FC236}">
-              <a16:creationId xmlns:a16="http://schemas.microsoft.com/office/drawing/2014/main" id="{AE7302E3-0E65-50A9-29AF-4F78EE93E708}"/>
-            </a:ext>
-          </a:extLst>
-        </p:cNvPr>
-        <p:cNvGrpSpPr/>
-        <p:nvPr/>
-      </p:nvGrpSpPr>
-      <p:grpSpPr>
-        <a:xfrm>
-          <a:off x="0" y="0"/>
-          <a:ext cx="0" cy="0"/>
-          <a:chOff x="0" y="0"/>
-          <a:chExt cx="0" cy="0"/>
-        </a:xfrm>
-      </p:grpSpPr>
-      <p:sp>
-        <p:nvSpPr>
-          <p:cNvPr id="2" name="Slide Image Placeholder 1">
-            <a:extLst>
-              <a:ext uri="{FF2B5EF4-FFF2-40B4-BE49-F238E27FC236}">
-                <a16:creationId xmlns:a16="http://schemas.microsoft.com/office/drawing/2014/main" id="{BBED610F-150B-E00A-690D-0AF54F7641D9}"/>
-              </a:ext>
-            </a:extLst>
-          </p:cNvPr>
-          <p:cNvSpPr>
-            <a:spLocks noGrp="1" noRot="1" noChangeAspect="1"/>
-          </p:cNvSpPr>
-          <p:nvPr>
-            <p:ph type="sldImg"/>
-          </p:nvPr>
-        </p:nvSpPr>
-        <p:spPr/>
-      </p:sp>
-      <p:sp>
-        <p:nvSpPr>
-          <p:cNvPr id="3" name="Notes Placeholder 2">
-            <a:extLst>
-              <a:ext uri="{FF2B5EF4-FFF2-40B4-BE49-F238E27FC236}">
-                <a16:creationId xmlns:a16="http://schemas.microsoft.com/office/drawing/2014/main" id="{6FDD50B1-F644-D016-4F98-97AA12D48646}"/>
-              </a:ext>
-            </a:extLst>
-          </p:cNvPr>
-          <p:cNvSpPr>
-            <a:spLocks noGrp="1"/>
-          </p:cNvSpPr>
-          <p:nvPr>
-            <p:ph type="body" idx="1"/>
-          </p:nvPr>
-        </p:nvSpPr>
-        <p:spPr/>
-        <p:txBody>
-          <a:bodyPr/>
-          <a:lstStyle/>
-          <a:p>
-            <a:endParaRPr lang="en-US" dirty="0"/>
-          </a:p>
-        </p:txBody>
-      </p:sp>
-      <p:sp>
-        <p:nvSpPr>
-          <p:cNvPr id="4" name="Slide Number Placeholder 3">
-            <a:extLst>
-              <a:ext uri="{FF2B5EF4-FFF2-40B4-BE49-F238E27FC236}">
-                <a16:creationId xmlns:a16="http://schemas.microsoft.com/office/drawing/2014/main" id="{C3E0D35D-DBE5-7DA6-7DE4-AA6587B6D6AA}"/>
-              </a:ext>
-            </a:extLst>
-          </p:cNvPr>
-          <p:cNvSpPr>
-            <a:spLocks noGrp="1"/>
-          </p:cNvSpPr>
-          <p:nvPr>
-            <p:ph type="sldNum" sz="quarter" idx="5"/>
-          </p:nvPr>
-        </p:nvSpPr>
-        <p:spPr/>
-        <p:txBody>
-          <a:bodyPr/>
-          <a:lstStyle/>
-          <a:p>
-            <a:fld id="{A89C7E07-3C67-C64C-8DA0-0404F6303970}" type="slidenum">
-              <a:rPr lang="en-US" smtClean="0"/>
-              <a:t>13</a:t>
-            </a:fld>
-            <a:endParaRPr lang="en-US" dirty="0"/>
-          </a:p>
-        </p:txBody>
-      </p:sp>
-    </p:spTree>
-    <p:extLst>
-      <p:ext uri="{BB962C8B-B14F-4D97-AF65-F5344CB8AC3E}">
-        <p14:creationId xmlns:p14="http://schemas.microsoft.com/office/powerpoint/2010/main" val="4002263993"/>
-      </p:ext>
-    </p:extLst>
-  </p:cSld>
-  <p:clrMapOvr>
-    <a:masterClrMapping/>
-  </p:clrMapOvr>
-</p:notes>
-</file>
-
-<file path=ppt/notesSlides/notesSlide14.xml><?xml version="1.0" encoding="utf-8"?>
+<file path=ppt/notesSlides/notesSlide11.xml><?xml version="1.0" encoding="utf-8"?>
 <p:notes xmlns:a="http://schemas.openxmlformats.org/drawingml/2006/main" xmlns:r="http://schemas.openxmlformats.org/officeDocument/2006/relationships" xmlns:p="http://schemas.openxmlformats.org/presentationml/2006/main">
   <p:cSld>
     <p:spTree>
@@ -1261,7 +985,7 @@
 </p:notes>
 </file>
 
-<file path=ppt/notesSlides/notesSlide15.xml><?xml version="1.0" encoding="utf-8"?>
+<file path=ppt/notesSlides/notesSlide12.xml><?xml version="1.0" encoding="utf-8"?>
 <p:notes xmlns:a="http://schemas.openxmlformats.org/drawingml/2006/main" xmlns:r="http://schemas.openxmlformats.org/officeDocument/2006/relationships" xmlns:p="http://schemas.openxmlformats.org/presentationml/2006/main">
   <p:cSld>
     <p:spTree>
@@ -2022,7 +1746,7 @@
           <a:p>
             <a:fld id="{A89C7E07-3C67-C64C-8DA0-0404F6303970}" type="slidenum">
               <a:rPr lang="en-US" smtClean="0"/>
-              <a:t>9</a:t>
+              <a:t>11</a:t>
             </a:fld>
             <a:endParaRPr lang="en-US" dirty="0"/>
           </a:p>
@@ -2031,7 +1755,7 @@
     </p:spTree>
     <p:extLst>
       <p:ext uri="{BB962C8B-B14F-4D97-AF65-F5344CB8AC3E}">
-        <p14:creationId xmlns:p14="http://schemas.microsoft.com/office/powerpoint/2010/main" val="634596896"/>
+        <p14:creationId xmlns:p14="http://schemas.microsoft.com/office/powerpoint/2010/main" val="4050233131"/>
       </p:ext>
     </p:extLst>
   </p:cSld>
@@ -10432,10 +10156,10 @@
       </p:grpSpPr>
       <p:sp>
         <p:nvSpPr>
-          <p:cNvPr id="2" name="Title 1">
+          <p:cNvPr id="5" name="Title 1">
             <a:extLst>
               <a:ext uri="{FF2B5EF4-FFF2-40B4-BE49-F238E27FC236}">
-                <a16:creationId xmlns:a16="http://schemas.microsoft.com/office/drawing/2014/main" id="{F52A871D-B15E-C971-7C85-0AF173E38781}"/>
+                <a16:creationId xmlns:a16="http://schemas.microsoft.com/office/drawing/2014/main" id="{B67BBDAE-FA81-9795-7234-C0A6D730C19E}"/>
               </a:ext>
             </a:extLst>
           </p:cNvPr>
@@ -10448,132 +10172,902 @@
         </p:nvSpPr>
         <p:spPr>
           <a:xfrm>
-            <a:off x="575310" y="278129"/>
-            <a:ext cx="5063490" cy="2354026"/>
+            <a:off x="1797684" y="-182522"/>
+            <a:ext cx="8702675" cy="742395"/>
           </a:xfrm>
         </p:spPr>
         <p:txBody>
           <a:bodyPr/>
           <a:lstStyle/>
           <a:p>
-            <a:r>
-              <a:rPr lang="en-US" dirty="0"/>
-              <a:t>AI/ML Details</a:t>
+            <a:pPr algn="ctr"/>
+            <a:r>
+              <a:rPr lang="en-US" sz="3600" dirty="0"/>
+              <a:t>AI/ML/DL Details and Formulas</a:t>
             </a:r>
           </a:p>
         </p:txBody>
       </p:sp>
       <p:sp>
         <p:nvSpPr>
-          <p:cNvPr id="3" name="Content Placeholder 2">
+          <p:cNvPr id="8" name="Rectangle 7">
             <a:extLst>
               <a:ext uri="{FF2B5EF4-FFF2-40B4-BE49-F238E27FC236}">
-                <a16:creationId xmlns:a16="http://schemas.microsoft.com/office/drawing/2014/main" id="{34F2E863-4A4C-76FE-444A-083F93043389}"/>
+                <a16:creationId xmlns:a16="http://schemas.microsoft.com/office/drawing/2014/main" id="{B3BBC3C9-588B-C1FB-76E5-ED11ADD3C1D7}"/>
               </a:ext>
             </a:extLst>
           </p:cNvPr>
-          <p:cNvSpPr>
-            <a:spLocks noGrp="1"/>
-          </p:cNvSpPr>
-          <p:nvPr>
-            <p:ph sz="quarter" idx="16"/>
-          </p:nvPr>
+          <p:cNvSpPr/>
+          <p:nvPr/>
         </p:nvSpPr>
         <p:spPr>
           <a:xfrm>
-            <a:off x="593725" y="3279775"/>
-            <a:ext cx="5045075" cy="2994025"/>
+            <a:off x="172720" y="732235"/>
+            <a:ext cx="8387716" cy="4703365"/>
           </a:xfrm>
+          <a:prstGeom prst="rect">
+            <a:avLst/>
+          </a:prstGeom>
+          <a:ln>
+            <a:headEnd type="none" w="med" len="med"/>
+            <a:tailEnd type="none" w="med" len="med"/>
+          </a:ln>
+        </p:spPr>
+        <p:style>
+          <a:lnRef idx="0">
+            <a:schemeClr val="accent1"/>
+          </a:lnRef>
+          <a:fillRef idx="3">
+            <a:schemeClr val="accent1"/>
+          </a:fillRef>
+          <a:effectRef idx="3">
+            <a:schemeClr val="accent1"/>
+          </a:effectRef>
+          <a:fontRef idx="minor">
+            <a:schemeClr val="lt1"/>
+          </a:fontRef>
+        </p:style>
+        <p:txBody>
+          <a:bodyPr rtlCol="0" anchor="ctr"/>
+          <a:lstStyle/>
+          <a:p>
+            <a:pPr algn="ctr"/>
+            <a:endParaRPr lang="en-IN"/>
+          </a:p>
+        </p:txBody>
+      </p:sp>
+      <p:sp>
+        <p:nvSpPr>
+          <p:cNvPr id="6" name="TextBox 5">
+            <a:extLst>
+              <a:ext uri="{FF2B5EF4-FFF2-40B4-BE49-F238E27FC236}">
+                <a16:creationId xmlns:a16="http://schemas.microsoft.com/office/drawing/2014/main" id="{28B0D333-9792-5119-FB64-AE597C1BB984}"/>
+              </a:ext>
+            </a:extLst>
+          </p:cNvPr>
+          <p:cNvSpPr txBox="1"/>
+          <p:nvPr/>
+        </p:nvSpPr>
+        <p:spPr>
+          <a:xfrm>
+            <a:off x="410844" y="904597"/>
+            <a:ext cx="8387716" cy="2862322"/>
+          </a:xfrm>
+          <a:prstGeom prst="rect">
+            <a:avLst/>
+          </a:prstGeom>
+          <a:noFill/>
         </p:spPr>
         <p:txBody>
-          <a:bodyPr>
-            <a:normAutofit fontScale="92500" lnSpcReduction="20000"/>
+          <a:bodyPr wrap="square" rtlCol="0">
+            <a:spAutoFit/>
           </a:bodyPr>
           <a:lstStyle/>
           <a:p>
             <a:pPr marL="342900" indent="-342900">
-              <a:buFont typeface="Arial" panose="020B0604020202020204" pitchFamily="34" charset="0"/>
-              <a:buChar char="•"/>
+              <a:buAutoNum type="arabicPeriod"/>
             </a:pPr>
             <a:r>
-              <a:rPr lang="en-US" dirty="0"/>
-              <a:t>Time-series anomaly detection for tides, temperatures</a:t>
-            </a:r>
-          </a:p>
-          <a:p>
-            <a:pPr marL="342900" indent="-342900">
-              <a:buFont typeface="Arial" panose="020B0604020202020204" pitchFamily="34" charset="0"/>
-              <a:buChar char="•"/>
+              <a:rPr lang="en-IN" b="1" dirty="0">
+                <a:solidFill>
+                  <a:schemeClr val="bg1"/>
+                </a:solidFill>
+              </a:rPr>
+              <a:t>Normalized Difference Vegetation Index (NDVI):</a:t>
+            </a:r>
+            <a:r>
+              <a:rPr lang="en-IN" dirty="0">
+                <a:solidFill>
+                  <a:schemeClr val="bg1"/>
+                </a:solidFill>
+              </a:rPr>
+              <a:t> </a:t>
+            </a:r>
+            <a:r>
+              <a:rPr lang="es-ES" dirty="0">
+                <a:solidFill>
+                  <a:schemeClr val="bg1"/>
+                </a:solidFill>
+              </a:rPr>
+              <a:t>NDVI = (NIR - Red) / (NIR + Red)</a:t>
+            </a:r>
+          </a:p>
+          <a:p>
+            <a:pPr lvl="1"/>
+            <a:r>
+              <a:rPr lang="es-ES" dirty="0">
+                <a:solidFill>
+                  <a:schemeClr val="bg1"/>
+                </a:solidFill>
+              </a:rPr>
+              <a:t>	</a:t>
+            </a:r>
+            <a:r>
+              <a:rPr lang="en-US" altLang="en-US" dirty="0">
+                <a:solidFill>
+                  <a:schemeClr val="bg1"/>
+                </a:solidFill>
+                <a:latin typeface="Arial" panose="020B0604020202020204" pitchFamily="34" charset="0"/>
+              </a:rPr>
+              <a:t>NIR = Near Infrared band (Band 8 in Sentinel-2) </a:t>
+            </a:r>
+          </a:p>
+          <a:p>
+            <a:pPr lvl="2" eaLnBrk="0" fontAlgn="base" hangingPunct="0">
+              <a:spcBef>
+                <a:spcPct val="0"/>
+              </a:spcBef>
+              <a:spcAft>
+                <a:spcPct val="0"/>
+              </a:spcAft>
             </a:pPr>
-            <a:endParaRPr lang="en-US" dirty="0"/>
-          </a:p>
-          <a:p>
-            <a:pPr marL="342900" indent="-342900">
-              <a:buFont typeface="Arial" panose="020B0604020202020204" pitchFamily="34" charset="0"/>
-              <a:buChar char="•"/>
+            <a:r>
+              <a:rPr lang="en-US" altLang="en-US" dirty="0">
+                <a:solidFill>
+                  <a:schemeClr val="bg1"/>
+                </a:solidFill>
+                <a:latin typeface="Arial" panose="020B0604020202020204" pitchFamily="34" charset="0"/>
+              </a:rPr>
+              <a:t>Red = Red band (Band 4 in Sentinel-2) </a:t>
+            </a:r>
+          </a:p>
+          <a:p>
+            <a:pPr lvl="2" eaLnBrk="0" fontAlgn="base" hangingPunct="0">
+              <a:spcBef>
+                <a:spcPct val="0"/>
+              </a:spcBef>
+              <a:spcAft>
+                <a:spcPct val="0"/>
+              </a:spcAft>
             </a:pPr>
-            <a:r>
-              <a:rPr lang="en-US" dirty="0"/>
-              <a:t>Pattern recognition for identifying pollution or illegal activity</a:t>
-            </a:r>
-          </a:p>
-          <a:p>
-            <a:pPr marL="342900" indent="-342900">
-              <a:buFont typeface="Arial" panose="020B0604020202020204" pitchFamily="34" charset="0"/>
-              <a:buChar char="•"/>
+            <a:endParaRPr lang="es-ES" dirty="0">
+              <a:solidFill>
+                <a:schemeClr val="bg1"/>
+              </a:solidFill>
+            </a:endParaRPr>
+          </a:p>
+          <a:p>
+            <a:r>
+              <a:rPr lang="en-IN" dirty="0">
+                <a:solidFill>
+                  <a:schemeClr val="bg1"/>
+                </a:solidFill>
+              </a:rPr>
+              <a:t>2. </a:t>
+            </a:r>
+            <a:r>
+              <a:rPr lang="en-IN" b="1" dirty="0">
+                <a:solidFill>
+                  <a:schemeClr val="bg1"/>
+                </a:solidFill>
+              </a:rPr>
+              <a:t>NDVI Change Detection Formula: </a:t>
+            </a:r>
+            <a:r>
+              <a:rPr lang="el-GR" dirty="0">
+                <a:solidFill>
+                  <a:schemeClr val="bg1"/>
+                </a:solidFill>
+              </a:rPr>
+              <a:t>Δ</a:t>
+            </a:r>
+            <a:r>
+              <a:rPr lang="en-IN" dirty="0">
+                <a:solidFill>
+                  <a:schemeClr val="bg1"/>
+                </a:solidFill>
+              </a:rPr>
+              <a:t>NDVI = NDVI(t₂) - NDVI(t₁)</a:t>
+            </a:r>
+            <a:endParaRPr lang="en-US" altLang="en-US" dirty="0">
+              <a:solidFill>
+                <a:schemeClr val="bg1"/>
+              </a:solidFill>
+              <a:latin typeface="Arial" panose="020B0604020202020204" pitchFamily="34" charset="0"/>
+            </a:endParaRPr>
+          </a:p>
+          <a:p>
+            <a:pPr lvl="2" eaLnBrk="0" fontAlgn="base" hangingPunct="0">
+              <a:spcBef>
+                <a:spcPct val="0"/>
+              </a:spcBef>
+              <a:spcAft>
+                <a:spcPct val="0"/>
+              </a:spcAft>
             </a:pPr>
-            <a:endParaRPr lang="en-US" dirty="0"/>
-          </a:p>
-          <a:p>
-            <a:pPr marL="342900" indent="-342900">
-              <a:buFont typeface="Arial" panose="020B0604020202020204" pitchFamily="34" charset="0"/>
-              <a:buChar char="•"/>
+            <a:r>
+              <a:rPr lang="en-US" altLang="en-US" dirty="0">
+                <a:solidFill>
+                  <a:schemeClr val="bg1"/>
+                </a:solidFill>
+                <a:latin typeface="Arial" panose="020B0604020202020204" pitchFamily="34" charset="0"/>
+              </a:rPr>
+              <a:t>NDVI(t₂) = NDVI at time period 2 (recent) </a:t>
+            </a:r>
+          </a:p>
+          <a:p>
+            <a:pPr lvl="2" eaLnBrk="0" fontAlgn="base" hangingPunct="0">
+              <a:spcBef>
+                <a:spcPct val="0"/>
+              </a:spcBef>
+              <a:spcAft>
+                <a:spcPct val="0"/>
+              </a:spcAft>
             </a:pPr>
             <a:r>
-              <a:rPr lang="en-US" dirty="0"/>
-              <a:t>Predictive models for storm surges and cyclonic threats</a:t>
+              <a:rPr lang="en-US" altLang="en-US" dirty="0">
+                <a:solidFill>
+                  <a:schemeClr val="bg1"/>
+                </a:solidFill>
+                <a:latin typeface="Arial" panose="020B0604020202020204" pitchFamily="34" charset="0"/>
+              </a:rPr>
+              <a:t>NDVI(t₁) = NDVI at time period 1 (baseline) </a:t>
+            </a:r>
+          </a:p>
+          <a:p>
+            <a:pPr lvl="2" eaLnBrk="0" fontAlgn="base" hangingPunct="0">
+              <a:spcBef>
+                <a:spcPct val="0"/>
+              </a:spcBef>
+              <a:spcAft>
+                <a:spcPct val="0"/>
+              </a:spcAft>
+            </a:pPr>
+            <a:endParaRPr lang="en-US" altLang="en-US" dirty="0">
+              <a:solidFill>
+                <a:schemeClr val="bg1"/>
+              </a:solidFill>
+              <a:latin typeface="Arial" panose="020B0604020202020204" pitchFamily="34" charset="0"/>
+            </a:endParaRPr>
+          </a:p>
+          <a:p>
+            <a:endParaRPr lang="en-IN" dirty="0">
+              <a:solidFill>
+                <a:schemeClr val="bg1"/>
+              </a:solidFill>
+            </a:endParaRPr>
+          </a:p>
+          <a:p>
+            <a:r>
+              <a:rPr lang="en-IN" dirty="0">
+                <a:solidFill>
+                  <a:schemeClr val="bg1"/>
+                </a:solidFill>
+              </a:rPr>
+              <a:t>	</a:t>
+            </a:r>
+          </a:p>
+        </p:txBody>
+      </p:sp>
+      <p:sp>
+        <p:nvSpPr>
+          <p:cNvPr id="7" name="TextBox 6">
+            <a:extLst>
+              <a:ext uri="{FF2B5EF4-FFF2-40B4-BE49-F238E27FC236}">
+                <a16:creationId xmlns:a16="http://schemas.microsoft.com/office/drawing/2014/main" id="{4A866193-5213-2805-92C1-2024B740DD02}"/>
+              </a:ext>
+            </a:extLst>
+          </p:cNvPr>
+          <p:cNvSpPr txBox="1"/>
+          <p:nvPr/>
+        </p:nvSpPr>
+        <p:spPr>
+          <a:xfrm>
+            <a:off x="304800" y="2953840"/>
+            <a:ext cx="8387716" cy="2585323"/>
+          </a:xfrm>
+          <a:prstGeom prst="rect">
+            <a:avLst/>
+          </a:prstGeom>
+          <a:noFill/>
+        </p:spPr>
+        <p:txBody>
+          <a:bodyPr wrap="square" rtlCol="0">
+            <a:spAutoFit/>
+          </a:bodyPr>
+          <a:lstStyle/>
+          <a:p>
+            <a:r>
+              <a:rPr lang="en-IN" b="1" dirty="0">
+                <a:solidFill>
+                  <a:schemeClr val="bg1"/>
+                </a:solidFill>
+                <a:cs typeface="Arial" panose="020B0604020202020204" pitchFamily="34" charset="0"/>
+              </a:rPr>
+              <a:t>3. Pixel Area Calculation: </a:t>
+            </a:r>
+            <a:r>
+              <a:rPr lang="en-US" dirty="0">
+                <a:solidFill>
+                  <a:schemeClr val="bg1"/>
+                </a:solidFill>
+              </a:rPr>
+              <a:t>Area = Σ(</a:t>
+            </a:r>
+            <a:r>
+              <a:rPr lang="en-US" dirty="0" err="1">
+                <a:solidFill>
+                  <a:schemeClr val="bg1"/>
+                </a:solidFill>
+              </a:rPr>
+              <a:t>Pixel_Area</a:t>
+            </a:r>
+            <a:r>
+              <a:rPr lang="en-US" dirty="0">
+                <a:solidFill>
+                  <a:schemeClr val="bg1"/>
+                </a:solidFill>
+              </a:rPr>
+              <a:t> × </a:t>
+            </a:r>
+            <a:r>
+              <a:rPr lang="en-US" dirty="0" err="1">
+                <a:solidFill>
+                  <a:schemeClr val="bg1"/>
+                </a:solidFill>
+              </a:rPr>
+              <a:t>Change_Mask</a:t>
+            </a:r>
+            <a:r>
+              <a:rPr lang="en-US" dirty="0">
+                <a:solidFill>
+                  <a:schemeClr val="bg1"/>
+                </a:solidFill>
+              </a:rPr>
+              <a:t>)</a:t>
+            </a:r>
+            <a:endParaRPr lang="en-US" altLang="en-US" dirty="0">
+              <a:solidFill>
+                <a:schemeClr val="bg1"/>
+              </a:solidFill>
+              <a:latin typeface="Arial" panose="020B0604020202020204" pitchFamily="34" charset="0"/>
+            </a:endParaRPr>
+          </a:p>
+          <a:p>
+            <a:pPr lvl="2" eaLnBrk="0" fontAlgn="base" hangingPunct="0">
+              <a:spcBef>
+                <a:spcPct val="0"/>
+              </a:spcBef>
+              <a:spcAft>
+                <a:spcPct val="0"/>
+              </a:spcAft>
+            </a:pPr>
+            <a:r>
+              <a:rPr lang="en-US" altLang="en-US" dirty="0" err="1">
+                <a:solidFill>
+                  <a:schemeClr val="bg1"/>
+                </a:solidFill>
+                <a:latin typeface="Arial" panose="020B0604020202020204" pitchFamily="34" charset="0"/>
+                <a:cs typeface="Arial" panose="020B0604020202020204" pitchFamily="34" charset="0"/>
+              </a:rPr>
+              <a:t>Pixel_Area</a:t>
+            </a:r>
+            <a:r>
+              <a:rPr lang="en-US" altLang="en-US" dirty="0">
+                <a:solidFill>
+                  <a:schemeClr val="bg1"/>
+                </a:solidFill>
+                <a:latin typeface="Arial" panose="020B0604020202020204" pitchFamily="34" charset="0"/>
+                <a:cs typeface="Arial" panose="020B0604020202020204" pitchFamily="34" charset="0"/>
+              </a:rPr>
+              <a:t> = </a:t>
+            </a:r>
+            <a:r>
+              <a:rPr lang="en-US" altLang="en-US" dirty="0" err="1">
+                <a:solidFill>
+                  <a:schemeClr val="bg1"/>
+                </a:solidFill>
+                <a:latin typeface="Arial" panose="020B0604020202020204" pitchFamily="34" charset="0"/>
+                <a:cs typeface="Arial" panose="020B0604020202020204" pitchFamily="34" charset="0"/>
+              </a:rPr>
+              <a:t>ee.Image.pixelArea</a:t>
+            </a:r>
+            <a:r>
+              <a:rPr lang="en-US" altLang="en-US" dirty="0">
+                <a:solidFill>
+                  <a:schemeClr val="bg1"/>
+                </a:solidFill>
+                <a:latin typeface="Arial" panose="020B0604020202020204" pitchFamily="34" charset="0"/>
+                <a:cs typeface="Arial" panose="020B0604020202020204" pitchFamily="34" charset="0"/>
+              </a:rPr>
+              <a:t>() (in square meters) </a:t>
+            </a:r>
+          </a:p>
+          <a:p>
+            <a:pPr lvl="2" eaLnBrk="0" fontAlgn="base" hangingPunct="0">
+              <a:spcBef>
+                <a:spcPct val="0"/>
+              </a:spcBef>
+              <a:spcAft>
+                <a:spcPct val="0"/>
+              </a:spcAft>
+            </a:pPr>
+            <a:r>
+              <a:rPr lang="en-US" altLang="en-US" dirty="0" err="1">
+                <a:solidFill>
+                  <a:schemeClr val="bg1"/>
+                </a:solidFill>
+                <a:latin typeface="Arial" panose="020B0604020202020204" pitchFamily="34" charset="0"/>
+                <a:cs typeface="Arial" panose="020B0604020202020204" pitchFamily="34" charset="0"/>
+              </a:rPr>
+              <a:t>Change_Mask</a:t>
+            </a:r>
+            <a:r>
+              <a:rPr lang="en-US" altLang="en-US" dirty="0">
+                <a:solidFill>
+                  <a:schemeClr val="bg1"/>
+                </a:solidFill>
+                <a:latin typeface="Arial" panose="020B0604020202020204" pitchFamily="34" charset="0"/>
+                <a:cs typeface="Arial" panose="020B0604020202020204" pitchFamily="34" charset="0"/>
+              </a:rPr>
+              <a:t> = Binary mask of significant changes </a:t>
+            </a:r>
+          </a:p>
+          <a:p>
+            <a:pPr lvl="1"/>
+            <a:endParaRPr lang="en-US" dirty="0">
+              <a:solidFill>
+                <a:schemeClr val="bg1"/>
+              </a:solidFill>
+              <a:latin typeface="Arial" panose="020B0604020202020204" pitchFamily="34" charset="0"/>
+              <a:cs typeface="Arial" panose="020B0604020202020204" pitchFamily="34" charset="0"/>
+            </a:endParaRPr>
+          </a:p>
+          <a:p>
+            <a:r>
+              <a:rPr lang="en-US" b="1" dirty="0">
+                <a:solidFill>
+                  <a:schemeClr val="bg1"/>
+                </a:solidFill>
+                <a:cs typeface="Arial" panose="020B0604020202020204" pitchFamily="34" charset="0"/>
+              </a:rPr>
+              <a:t>4. </a:t>
+            </a:r>
+            <a:r>
+              <a:rPr lang="en-IN" b="1" dirty="0">
+                <a:solidFill>
+                  <a:schemeClr val="bg1"/>
+                </a:solidFill>
+              </a:rPr>
+              <a:t>Cloud Masking Algorithm</a:t>
+            </a:r>
+            <a:r>
+              <a:rPr lang="en-US" b="1" dirty="0">
+                <a:solidFill>
+                  <a:schemeClr val="bg1"/>
+                </a:solidFill>
+                <a:cs typeface="Arial" panose="020B0604020202020204" pitchFamily="34" charset="0"/>
+              </a:rPr>
+              <a:t>: </a:t>
+            </a:r>
+            <a:r>
+              <a:rPr lang="en-US" dirty="0" err="1">
+                <a:solidFill>
+                  <a:schemeClr val="bg1"/>
+                </a:solidFill>
+              </a:rPr>
+              <a:t>Cloud_Mask</a:t>
+            </a:r>
+            <a:r>
+              <a:rPr lang="en-US" dirty="0">
+                <a:solidFill>
+                  <a:schemeClr val="bg1"/>
+                </a:solidFill>
+              </a:rPr>
+              <a:t> = (QA60 &amp; 2¹⁰ = 0) AND (QA60 &amp; 2¹¹ = 0)</a:t>
+            </a:r>
+            <a:endParaRPr lang="en-US" altLang="en-US" dirty="0">
+              <a:solidFill>
+                <a:schemeClr val="bg1"/>
+              </a:solidFill>
+              <a:latin typeface="Arial" panose="020B0604020202020204" pitchFamily="34" charset="0"/>
+            </a:endParaRPr>
+          </a:p>
+          <a:p>
+            <a:pPr lvl="2" eaLnBrk="0" fontAlgn="base" hangingPunct="0">
+              <a:spcBef>
+                <a:spcPct val="0"/>
+              </a:spcBef>
+              <a:spcAft>
+                <a:spcPct val="0"/>
+              </a:spcAft>
+            </a:pPr>
+            <a:r>
+              <a:rPr lang="en-US" altLang="en-US" dirty="0">
+                <a:solidFill>
+                  <a:schemeClr val="bg1"/>
+                </a:solidFill>
+                <a:latin typeface="Arial" panose="020B0604020202020204" pitchFamily="34" charset="0"/>
+              </a:rPr>
+              <a:t>QA60 = Quality Assessment band </a:t>
+            </a:r>
+          </a:p>
+          <a:p>
+            <a:pPr lvl="2" eaLnBrk="0" fontAlgn="base" hangingPunct="0">
+              <a:spcBef>
+                <a:spcPct val="0"/>
+              </a:spcBef>
+              <a:spcAft>
+                <a:spcPct val="0"/>
+              </a:spcAft>
+            </a:pPr>
+            <a:r>
+              <a:rPr lang="en-US" altLang="en-US" dirty="0">
+                <a:solidFill>
+                  <a:schemeClr val="bg1"/>
+                </a:solidFill>
+                <a:latin typeface="Arial" panose="020B0604020202020204" pitchFamily="34" charset="0"/>
+              </a:rPr>
+              <a:t>2¹⁰ = Cloud bit mask (1024) </a:t>
+            </a:r>
+          </a:p>
+          <a:p>
+            <a:pPr lvl="2" eaLnBrk="0" fontAlgn="base" hangingPunct="0">
+              <a:spcBef>
+                <a:spcPct val="0"/>
+              </a:spcBef>
+              <a:spcAft>
+                <a:spcPct val="0"/>
+              </a:spcAft>
+            </a:pPr>
+            <a:r>
+              <a:rPr lang="en-US" altLang="en-US" dirty="0">
+                <a:solidFill>
+                  <a:schemeClr val="bg1"/>
+                </a:solidFill>
+                <a:latin typeface="Arial" panose="020B0604020202020204" pitchFamily="34" charset="0"/>
+              </a:rPr>
+              <a:t>2¹¹ = Cirrus cloud bit mask (2048) </a:t>
+            </a:r>
+          </a:p>
+          <a:p>
+            <a:endParaRPr lang="en-IN" b="1" dirty="0">
+              <a:solidFill>
+                <a:schemeClr val="bg1"/>
+              </a:solidFill>
+              <a:cs typeface="Arial" panose="020B0604020202020204" pitchFamily="34" charset="0"/>
+            </a:endParaRPr>
+          </a:p>
+        </p:txBody>
+      </p:sp>
+      <p:sp>
+        <p:nvSpPr>
+          <p:cNvPr id="10" name="Rectangle 9">
+            <a:extLst>
+              <a:ext uri="{FF2B5EF4-FFF2-40B4-BE49-F238E27FC236}">
+                <a16:creationId xmlns:a16="http://schemas.microsoft.com/office/drawing/2014/main" id="{3529DA99-34D4-676E-D7D2-1132506B1C81}"/>
+              </a:ext>
+            </a:extLst>
+          </p:cNvPr>
+          <p:cNvSpPr/>
+          <p:nvPr/>
+        </p:nvSpPr>
+        <p:spPr>
+          <a:xfrm>
+            <a:off x="8666480" y="732235"/>
+            <a:ext cx="3500756" cy="5973365"/>
+          </a:xfrm>
+          <a:prstGeom prst="rect">
+            <a:avLst/>
+          </a:prstGeom>
+          <a:ln>
+            <a:headEnd type="none" w="med" len="med"/>
+            <a:tailEnd type="none" w="med" len="med"/>
+          </a:ln>
+        </p:spPr>
+        <p:style>
+          <a:lnRef idx="1">
+            <a:schemeClr val="accent4"/>
+          </a:lnRef>
+          <a:fillRef idx="2">
+            <a:schemeClr val="accent4"/>
+          </a:fillRef>
+          <a:effectRef idx="1">
+            <a:schemeClr val="accent4"/>
+          </a:effectRef>
+          <a:fontRef idx="minor">
+            <a:schemeClr val="dk1"/>
+          </a:fontRef>
+        </p:style>
+        <p:txBody>
+          <a:bodyPr rtlCol="0" anchor="ctr"/>
+          <a:lstStyle/>
+          <a:p>
+            <a:pPr algn="ctr"/>
+            <a:endParaRPr lang="en-IN" dirty="0"/>
+          </a:p>
+        </p:txBody>
+      </p:sp>
+      <p:sp>
+        <p:nvSpPr>
+          <p:cNvPr id="11" name="TextBox 10">
+            <a:extLst>
+              <a:ext uri="{FF2B5EF4-FFF2-40B4-BE49-F238E27FC236}">
+                <a16:creationId xmlns:a16="http://schemas.microsoft.com/office/drawing/2014/main" id="{1889836D-AEEC-5276-0E1F-B1539FED8EF2}"/>
+              </a:ext>
+            </a:extLst>
+          </p:cNvPr>
+          <p:cNvSpPr txBox="1"/>
+          <p:nvPr/>
+        </p:nvSpPr>
+        <p:spPr>
+          <a:xfrm>
+            <a:off x="8798560" y="1056640"/>
+            <a:ext cx="3220720" cy="369332"/>
+          </a:xfrm>
+          <a:prstGeom prst="rect">
+            <a:avLst/>
+          </a:prstGeom>
+          <a:noFill/>
+        </p:spPr>
+        <p:txBody>
+          <a:bodyPr wrap="square" rtlCol="0">
+            <a:spAutoFit/>
+          </a:bodyPr>
+          <a:lstStyle/>
+          <a:p>
+            <a:r>
+              <a:rPr lang="en-IN" dirty="0">
+                <a:solidFill>
+                  <a:schemeClr val="bg1"/>
+                </a:solidFill>
+              </a:rPr>
+              <a:t>1. Flood Risk Assessment: </a:t>
             </a:r>
           </a:p>
         </p:txBody>
       </p:sp>
       <p:pic>
         <p:nvPicPr>
-          <p:cNvPr id="5" name="Picture Placeholder 52" descr="Hanging lightbulbs">
+          <p:cNvPr id="15" name="Picture 14">
             <a:extLst>
               <a:ext uri="{FF2B5EF4-FFF2-40B4-BE49-F238E27FC236}">
-                <a16:creationId xmlns:a16="http://schemas.microsoft.com/office/drawing/2014/main" id="{F2B2501C-600C-11B3-1ECD-912D988906A5}"/>
+                <a16:creationId xmlns:a16="http://schemas.microsoft.com/office/drawing/2014/main" id="{C1A0492D-2133-9AAF-9A54-4A6A69C2AF8D}"/>
               </a:ext>
             </a:extLst>
           </p:cNvPr>
           <p:cNvPicPr>
-            <a:picLocks noGrp="1" noChangeAspect="1"/>
+            <a:picLocks noChangeAspect="1"/>
           </p:cNvPicPr>
-          <p:nvPr>
-            <p:ph type="pic" sz="quarter" idx="15"/>
-          </p:nvPr>
+          <p:nvPr/>
         </p:nvPicPr>
         <p:blipFill>
-          <a:blip r:embed="rId3">
-            <a:extLst>
-              <a:ext uri="{28A0092B-C50C-407E-A947-70E740481C1C}">
-                <a14:useLocalDpi xmlns:a14="http://schemas.microsoft.com/office/drawing/2010/main" val="0"/>
-              </a:ext>
-            </a:extLst>
-          </a:blip>
-          <a:srcRect l="16" r="16"/>
-          <a:stretch/>
+          <a:blip r:embed="rId2"/>
+          <a:stretch>
+            <a:fillRect/>
+          </a:stretch>
         </p:blipFill>
         <p:spPr>
           <a:xfrm>
-            <a:off x="6096000" y="0"/>
-            <a:ext cx="6118225" cy="6858000"/>
+            <a:off x="8878654" y="1425972"/>
+            <a:ext cx="3243409" cy="2369611"/>
           </a:xfrm>
+          <a:prstGeom prst="rect">
+            <a:avLst/>
+          </a:prstGeom>
+        </p:spPr>
+      </p:pic>
+      <p:sp>
+        <p:nvSpPr>
+          <p:cNvPr id="16" name="TextBox 15">
+            <a:extLst>
+              <a:ext uri="{FF2B5EF4-FFF2-40B4-BE49-F238E27FC236}">
+                <a16:creationId xmlns:a16="http://schemas.microsoft.com/office/drawing/2014/main" id="{1D4E10F0-B041-3596-DD25-C2019268B0D5}"/>
+              </a:ext>
+            </a:extLst>
+          </p:cNvPr>
+          <p:cNvSpPr txBox="1"/>
+          <p:nvPr/>
+        </p:nvSpPr>
+        <p:spPr>
+          <a:xfrm>
+            <a:off x="8905876" y="3795583"/>
+            <a:ext cx="3048000" cy="1477328"/>
+          </a:xfrm>
+          <a:prstGeom prst="rect">
+            <a:avLst/>
+          </a:prstGeom>
+          <a:noFill/>
+        </p:spPr>
+        <p:txBody>
+          <a:bodyPr wrap="square" rtlCol="0">
+            <a:spAutoFit/>
+          </a:bodyPr>
+          <a:lstStyle/>
+          <a:p>
+            <a:r>
+              <a:rPr lang="en-IN" dirty="0">
+                <a:solidFill>
+                  <a:schemeClr val="bg1"/>
+                </a:solidFill>
+              </a:rPr>
+              <a:t>2. Temporal Composite Median Filter:</a:t>
+            </a:r>
+          </a:p>
+          <a:p>
+            <a:r>
+              <a:rPr lang="en-IN" dirty="0">
+                <a:solidFill>
+                  <a:schemeClr val="bg1"/>
+                </a:solidFill>
+              </a:rPr>
+              <a:t>3. Spatial Resolution Scale Factor</a:t>
+            </a:r>
+          </a:p>
+          <a:p>
+            <a:endParaRPr lang="en-IN" dirty="0">
+              <a:solidFill>
+                <a:schemeClr val="bg1"/>
+              </a:solidFill>
+            </a:endParaRPr>
+          </a:p>
+        </p:txBody>
+      </p:sp>
+      <p:pic>
+        <p:nvPicPr>
+          <p:cNvPr id="18" name="Picture 17">
+            <a:extLst>
+              <a:ext uri="{FF2B5EF4-FFF2-40B4-BE49-F238E27FC236}">
+                <a16:creationId xmlns:a16="http://schemas.microsoft.com/office/drawing/2014/main" id="{67994F2B-3959-87F7-F81F-8093DD04A5A2}"/>
+              </a:ext>
+            </a:extLst>
+          </p:cNvPr>
+          <p:cNvPicPr>
+            <a:picLocks noChangeAspect="1"/>
+          </p:cNvPicPr>
+          <p:nvPr/>
+        </p:nvPicPr>
+        <p:blipFill>
+          <a:blip r:embed="rId3"/>
+          <a:stretch>
+            <a:fillRect/>
+          </a:stretch>
+        </p:blipFill>
+        <p:spPr>
+          <a:xfrm>
+            <a:off x="8905876" y="5029235"/>
+            <a:ext cx="3243410" cy="832076"/>
+          </a:xfrm>
+          <a:prstGeom prst="rect">
+            <a:avLst/>
+          </a:prstGeom>
+        </p:spPr>
+      </p:pic>
+      <p:sp>
+        <p:nvSpPr>
+          <p:cNvPr id="19" name="TextBox 18">
+            <a:extLst>
+              <a:ext uri="{FF2B5EF4-FFF2-40B4-BE49-F238E27FC236}">
+                <a16:creationId xmlns:a16="http://schemas.microsoft.com/office/drawing/2014/main" id="{1C54277C-2D40-E1B7-E2AE-DB875CCE9128}"/>
+              </a:ext>
+            </a:extLst>
+          </p:cNvPr>
+          <p:cNvSpPr txBox="1"/>
+          <p:nvPr/>
+        </p:nvSpPr>
+        <p:spPr>
+          <a:xfrm>
+            <a:off x="3556001" y="5792447"/>
+            <a:ext cx="4135120" cy="369332"/>
+          </a:xfrm>
+          <a:prstGeom prst="rect">
+            <a:avLst/>
+          </a:prstGeom>
+          <a:noFill/>
+        </p:spPr>
+        <p:txBody>
+          <a:bodyPr wrap="square" rtlCol="0">
+            <a:spAutoFit/>
+          </a:bodyPr>
+          <a:lstStyle/>
+          <a:p>
+            <a:r>
+              <a:rPr lang="en-IN" b="1" dirty="0">
+                <a:solidFill>
+                  <a:schemeClr val="bg1"/>
+                </a:solidFill>
+              </a:rPr>
+              <a:t>AOI Change                     Flood detection</a:t>
+            </a:r>
+          </a:p>
+        </p:txBody>
+      </p:sp>
+      <p:pic>
+        <p:nvPicPr>
+          <p:cNvPr id="21" name="Graphic 20" descr="Arrow: Clockwise curve with solid fill">
+            <a:extLst>
+              <a:ext uri="{FF2B5EF4-FFF2-40B4-BE49-F238E27FC236}">
+                <a16:creationId xmlns:a16="http://schemas.microsoft.com/office/drawing/2014/main" id="{57EB1C76-BC32-A544-DEA1-EA9CC9AFDADC}"/>
+              </a:ext>
+            </a:extLst>
+          </p:cNvPr>
+          <p:cNvPicPr>
+            <a:picLocks noChangeAspect="1"/>
+          </p:cNvPicPr>
+          <p:nvPr/>
+        </p:nvPicPr>
+        <p:blipFill>
+          <a:blip r:embed="rId4">
+            <a:extLst>
+              <a:ext uri="{96DAC541-7B7A-43D3-8B79-37D633B846F1}">
+                <asvg:svgBlip xmlns:asvg="http://schemas.microsoft.com/office/drawing/2016/SVG/main" r:embed="rId5"/>
+              </a:ext>
+            </a:extLst>
+          </a:blip>
+          <a:stretch>
+            <a:fillRect/>
+          </a:stretch>
+        </p:blipFill>
+        <p:spPr>
+          <a:xfrm rot="6375848">
+            <a:off x="7545261" y="5404111"/>
+            <a:ext cx="914400" cy="914400"/>
+          </a:xfrm>
+          <a:prstGeom prst="rect">
+            <a:avLst/>
+          </a:prstGeom>
+        </p:spPr>
+      </p:pic>
+      <p:pic>
+        <p:nvPicPr>
+          <p:cNvPr id="22" name="Graphic 21" descr="Arrow: Clockwise curve with solid fill">
+            <a:extLst>
+              <a:ext uri="{FF2B5EF4-FFF2-40B4-BE49-F238E27FC236}">
+                <a16:creationId xmlns:a16="http://schemas.microsoft.com/office/drawing/2014/main" id="{E5C0A0D4-48D7-4FC0-82AE-689E35AC9CED}"/>
+              </a:ext>
+            </a:extLst>
+          </p:cNvPr>
+          <p:cNvPicPr>
+            <a:picLocks noChangeAspect="1"/>
+          </p:cNvPicPr>
+          <p:nvPr/>
+        </p:nvPicPr>
+        <p:blipFill>
+          <a:blip r:embed="rId4">
+            <a:extLst>
+              <a:ext uri="{96DAC541-7B7A-43D3-8B79-37D633B846F1}">
+                <asvg:svgBlip xmlns:asvg="http://schemas.microsoft.com/office/drawing/2016/SVG/main" r:embed="rId5"/>
+              </a:ext>
+            </a:extLst>
+          </a:blip>
+          <a:stretch>
+            <a:fillRect/>
+          </a:stretch>
+        </p:blipFill>
+        <p:spPr>
+          <a:xfrm rot="19240917">
+            <a:off x="2763522" y="5648603"/>
+            <a:ext cx="914400" cy="914400"/>
+          </a:xfrm>
+          <a:prstGeom prst="rect">
+            <a:avLst/>
+          </a:prstGeom>
         </p:spPr>
       </p:pic>
     </p:spTree>
     <p:extLst>
       <p:ext uri="{BB962C8B-B14F-4D97-AF65-F5344CB8AC3E}">
-        <p14:creationId xmlns:p14="http://schemas.microsoft.com/office/powerpoint/2010/main" val="298364507"/>
+        <p14:creationId xmlns:p14="http://schemas.microsoft.com/office/powerpoint/2010/main" val="1155417919"/>
       </p:ext>
     </p:extLst>
   </p:cSld>
@@ -11075,13 +11569,7 @@
   <p:cSld>
     <p:spTree>
       <p:nvGrpSpPr>
-        <p:cNvPr id="1" name="">
-          <a:extLst>
-            <a:ext uri="{FF2B5EF4-FFF2-40B4-BE49-F238E27FC236}">
-              <a16:creationId xmlns:a16="http://schemas.microsoft.com/office/drawing/2014/main" id="{97C6F2FB-A817-E202-6B7D-1562BED43D39}"/>
-            </a:ext>
-          </a:extLst>
-        </p:cNvPr>
+        <p:cNvPr id="1" name=""/>
         <p:cNvGrpSpPr/>
         <p:nvPr/>
       </p:nvGrpSpPr>
@@ -11095,10 +11583,10 @@
       </p:grpSpPr>
       <p:sp>
         <p:nvSpPr>
-          <p:cNvPr id="3" name="Title 2">
+          <p:cNvPr id="4" name="Title 1">
             <a:extLst>
               <a:ext uri="{FF2B5EF4-FFF2-40B4-BE49-F238E27FC236}">
-                <a16:creationId xmlns:a16="http://schemas.microsoft.com/office/drawing/2014/main" id="{8CEA8792-3B5C-387B-C228-DDC38D4815BC}"/>
+                <a16:creationId xmlns:a16="http://schemas.microsoft.com/office/drawing/2014/main" id="{D5B8DE88-DA13-4532-B924-3C66C47590EB}"/>
               </a:ext>
             </a:extLst>
           </p:cNvPr>
@@ -11111,8 +11599,8 @@
         </p:nvSpPr>
         <p:spPr>
           <a:xfrm>
-            <a:off x="594360" y="102875"/>
-            <a:ext cx="10873740" cy="1680205"/>
+            <a:off x="410555" y="69362"/>
+            <a:ext cx="4445000" cy="722302"/>
           </a:xfrm>
         </p:spPr>
         <p:txBody>
@@ -11121,400 +11609,339 @@
           <a:p>
             <a:r>
               <a:rPr lang="en-US" dirty="0"/>
-              <a:t>Demo &amp; Use Case Scenarios</a:t>
+              <a:t>Output Diagrams</a:t>
             </a:r>
           </a:p>
         </p:txBody>
       </p:sp>
       <p:sp>
         <p:nvSpPr>
-          <p:cNvPr id="7" name="Text Placeholder 6">
+          <p:cNvPr id="17" name="Rectangle 16">
             <a:extLst>
               <a:ext uri="{FF2B5EF4-FFF2-40B4-BE49-F238E27FC236}">
-                <a16:creationId xmlns:a16="http://schemas.microsoft.com/office/drawing/2014/main" id="{0237B89A-2639-F548-A5C1-DC3025FFECBB}"/>
+                <a16:creationId xmlns:a16="http://schemas.microsoft.com/office/drawing/2014/main" id="{BE95A9D4-ED0F-8A7C-3E05-B1E0B5165ECB}"/>
               </a:ext>
             </a:extLst>
           </p:cNvPr>
-          <p:cNvSpPr>
-            <a:spLocks noGrp="1"/>
-          </p:cNvSpPr>
-          <p:nvPr>
-            <p:ph sz="quarter" idx="13"/>
-          </p:nvPr>
+          <p:cNvSpPr/>
+          <p:nvPr/>
         </p:nvSpPr>
         <p:spPr>
           <a:xfrm>
-            <a:off x="3657600" y="2281238"/>
-            <a:ext cx="7810500" cy="3700462"/>
+            <a:off x="317634" y="1867301"/>
+            <a:ext cx="2807409" cy="448246"/>
           </a:xfrm>
+          <a:prstGeom prst="rect">
+            <a:avLst/>
+          </a:prstGeom>
+          <a:solidFill>
+            <a:schemeClr val="tx1"/>
+          </a:solidFill>
+          <a:ln>
+            <a:solidFill>
+              <a:schemeClr val="tx1"/>
+            </a:solidFill>
+          </a:ln>
+        </p:spPr>
+        <p:style>
+          <a:lnRef idx="2">
+            <a:schemeClr val="accent1"/>
+          </a:lnRef>
+          <a:fillRef idx="1">
+            <a:schemeClr val="lt1"/>
+          </a:fillRef>
+          <a:effectRef idx="0">
+            <a:schemeClr val="accent1"/>
+          </a:effectRef>
+          <a:fontRef idx="minor">
+            <a:schemeClr val="dk1"/>
+          </a:fontRef>
+        </p:style>
+        <p:txBody>
+          <a:bodyPr rtlCol="0" anchor="ctr"/>
+          <a:lstStyle/>
+          <a:p>
+            <a:pPr algn="ctr"/>
+            <a:endParaRPr lang="en-IN"/>
+          </a:p>
+        </p:txBody>
+      </p:sp>
+      <p:pic>
+        <p:nvPicPr>
+          <p:cNvPr id="6" name="Picture 5">
+            <a:extLst>
+              <a:ext uri="{FF2B5EF4-FFF2-40B4-BE49-F238E27FC236}">
+                <a16:creationId xmlns:a16="http://schemas.microsoft.com/office/drawing/2014/main" id="{800AAFF8-E13E-4E19-CE9A-6F40E353F18E}"/>
+              </a:ext>
+            </a:extLst>
+          </p:cNvPr>
+          <p:cNvPicPr>
+            <a:picLocks noChangeAspect="1"/>
+          </p:cNvPicPr>
+          <p:nvPr/>
+        </p:nvPicPr>
+        <p:blipFill>
+          <a:blip r:embed="rId2">
+            <a:extLst>
+              <a:ext uri="{28A0092B-C50C-407E-A947-70E740481C1C}">
+                <a14:useLocalDpi xmlns:a14="http://schemas.microsoft.com/office/drawing/2010/main" val="0"/>
+              </a:ext>
+            </a:extLst>
+          </a:blip>
+          <a:stretch>
+            <a:fillRect/>
+          </a:stretch>
+        </p:blipFill>
+        <p:spPr>
+          <a:xfrm>
+            <a:off x="9066958" y="324535"/>
+            <a:ext cx="2915682" cy="6208930"/>
+          </a:xfrm>
+          <a:prstGeom prst="rect">
+            <a:avLst/>
+          </a:prstGeom>
+        </p:spPr>
+      </p:pic>
+      <p:pic>
+        <p:nvPicPr>
+          <p:cNvPr id="7" name="Picture 6">
+            <a:extLst>
+              <a:ext uri="{FF2B5EF4-FFF2-40B4-BE49-F238E27FC236}">
+                <a16:creationId xmlns:a16="http://schemas.microsoft.com/office/drawing/2014/main" id="{10B78478-EAC7-B023-5C56-FC453C86B2FF}"/>
+              </a:ext>
+            </a:extLst>
+          </p:cNvPr>
+          <p:cNvPicPr>
+            <a:picLocks noChangeAspect="1"/>
+          </p:cNvPicPr>
+          <p:nvPr/>
+        </p:nvPicPr>
+        <p:blipFill>
+          <a:blip r:embed="rId3"/>
+          <a:stretch>
+            <a:fillRect/>
+          </a:stretch>
+        </p:blipFill>
+        <p:spPr>
+          <a:xfrm>
+            <a:off x="2633055" y="1005404"/>
+            <a:ext cx="1537802" cy="1580440"/>
+          </a:xfrm>
+          <a:prstGeom prst="rect">
+            <a:avLst/>
+          </a:prstGeom>
+        </p:spPr>
+      </p:pic>
+      <p:pic>
+        <p:nvPicPr>
+          <p:cNvPr id="8" name="Picture 7">
+            <a:extLst>
+              <a:ext uri="{FF2B5EF4-FFF2-40B4-BE49-F238E27FC236}">
+                <a16:creationId xmlns:a16="http://schemas.microsoft.com/office/drawing/2014/main" id="{08C97B09-EA0C-E6DB-A248-31D1BE29A2DE}"/>
+              </a:ext>
+            </a:extLst>
+          </p:cNvPr>
+          <p:cNvPicPr>
+            <a:picLocks noChangeAspect="1"/>
+          </p:cNvPicPr>
+          <p:nvPr/>
+        </p:nvPicPr>
+        <p:blipFill>
+          <a:blip r:embed="rId4"/>
+          <a:stretch>
+            <a:fillRect/>
+          </a:stretch>
+        </p:blipFill>
+        <p:spPr>
+          <a:xfrm>
+            <a:off x="9282" y="1101429"/>
+            <a:ext cx="1427628" cy="1494596"/>
+          </a:xfrm>
+          <a:prstGeom prst="rect">
+            <a:avLst/>
+          </a:prstGeom>
+        </p:spPr>
+      </p:pic>
+      <p:sp>
+        <p:nvSpPr>
+          <p:cNvPr id="9" name="TextBox 8">
+            <a:extLst>
+              <a:ext uri="{FF2B5EF4-FFF2-40B4-BE49-F238E27FC236}">
+                <a16:creationId xmlns:a16="http://schemas.microsoft.com/office/drawing/2014/main" id="{D1E299EC-3326-E213-8FCA-929CFEBD0D99}"/>
+              </a:ext>
+            </a:extLst>
+          </p:cNvPr>
+          <p:cNvSpPr txBox="1"/>
+          <p:nvPr/>
+        </p:nvSpPr>
+        <p:spPr>
+          <a:xfrm>
+            <a:off x="1436910" y="1587117"/>
+            <a:ext cx="1286776" cy="523220"/>
+          </a:xfrm>
+          <a:prstGeom prst="rect">
+            <a:avLst/>
+          </a:prstGeom>
+          <a:noFill/>
         </p:spPr>
         <p:txBody>
-          <a:bodyPr>
-            <a:normAutofit/>
+          <a:bodyPr wrap="square" rtlCol="0">
+            <a:spAutoFit/>
           </a:bodyPr>
           <a:lstStyle/>
           <a:p>
-            <a:r>
-              <a:rPr lang="en-US" dirty="0"/>
-              <a:t>Live dashboard demo with real/simulated data</a:t>
-            </a:r>
-          </a:p>
-          <a:p>
-            <a:endParaRPr lang="en-US" dirty="0"/>
-          </a:p>
-          <a:p>
-            <a:r>
-              <a:rPr lang="en-US" dirty="0"/>
-              <a:t>Alert notification walkthrough to stakeholders</a:t>
-            </a:r>
-          </a:p>
-          <a:p>
-            <a:endParaRPr lang="en-US" dirty="0"/>
-          </a:p>
-          <a:p>
-            <a:r>
-              <a:rPr lang="en-US" dirty="0"/>
-              <a:t>Role-play: authority response and community action</a:t>
+            <a:pPr algn="ctr"/>
+            <a:r>
+              <a:rPr lang="en-IN" sz="1400" dirty="0">
+                <a:solidFill>
+                  <a:schemeClr val="bg1"/>
+                </a:solidFill>
+                <a:latin typeface="Times New Roman" panose="02020603050405020304" pitchFamily="18" charset="0"/>
+                <a:cs typeface="Times New Roman" panose="02020603050405020304" pitchFamily="18" charset="0"/>
+              </a:rPr>
+              <a:t>After</a:t>
+            </a:r>
+          </a:p>
+          <a:p>
+            <a:pPr algn="ctr"/>
+            <a:r>
+              <a:rPr lang="en-IN" sz="1400" dirty="0">
+                <a:solidFill>
+                  <a:schemeClr val="bg1"/>
+                </a:solidFill>
+                <a:latin typeface="Times New Roman" panose="02020603050405020304" pitchFamily="18" charset="0"/>
+                <a:cs typeface="Times New Roman" panose="02020603050405020304" pitchFamily="18" charset="0"/>
+              </a:rPr>
+              <a:t>Deforestation</a:t>
             </a:r>
           </a:p>
         </p:txBody>
       </p:sp>
-      <p:grpSp>
-        <p:nvGrpSpPr>
-          <p:cNvPr id="19" name="Group 18">
+      <p:cxnSp>
+        <p:nvCxnSpPr>
+          <p:cNvPr id="11" name="Straight Arrow Connector 10">
             <a:extLst>
               <a:ext uri="{FF2B5EF4-FFF2-40B4-BE49-F238E27FC236}">
-                <a16:creationId xmlns:a16="http://schemas.microsoft.com/office/drawing/2014/main" id="{3EACBA0A-781F-F6A9-091B-EFE8D68A90A5}"/>
-              </a:ext>
-              <a:ext uri="{C183D7F6-B498-43B3-948B-1728B52AA6E4}">
-                <adec:decorative xmlns:adec="http://schemas.microsoft.com/office/drawing/2017/decorative" val="1"/>
+                <a16:creationId xmlns:a16="http://schemas.microsoft.com/office/drawing/2014/main" id="{00F8421D-4B70-2B35-C002-2A29B5783F5D}"/>
               </a:ext>
             </a:extLst>
           </p:cNvPr>
-          <p:cNvGrpSpPr>
-            <a:grpSpLocks/>
-          </p:cNvGrpSpPr>
+          <p:cNvCxnSpPr>
+            <a:stCxn id="9" idx="1"/>
+            <a:endCxn id="9" idx="3"/>
+          </p:cNvCxnSpPr>
           <p:nvPr/>
-        </p:nvGrpSpPr>
-        <p:grpSpPr bwMode="auto">
-          <a:xfrm rot="16200000" flipV="1">
-            <a:off x="0" y="3900132"/>
-            <a:ext cx="2959226" cy="2959226"/>
-            <a:chOff x="0" y="12289"/>
-            <a:chExt cx="3550" cy="3551"/>
+        </p:nvCxnSpPr>
+        <p:spPr>
+          <a:xfrm>
+            <a:off x="1436910" y="1848727"/>
+            <a:ext cx="1286776" cy="0"/>
           </a:xfrm>
-        </p:grpSpPr>
-        <p:sp>
-          <p:nvSpPr>
-            <p:cNvPr id="20" name="Freeform 19">
-              <a:extLst>
-                <a:ext uri="{FF2B5EF4-FFF2-40B4-BE49-F238E27FC236}">
-                  <a16:creationId xmlns:a16="http://schemas.microsoft.com/office/drawing/2014/main" id="{7BA2555C-754C-45E9-83B4-1B3891146215}"/>
-                </a:ext>
-              </a:extLst>
-            </p:cNvPr>
-            <p:cNvSpPr>
-              <a:spLocks/>
-            </p:cNvSpPr>
-            <p:nvPr/>
-          </p:nvSpPr>
-          <p:spPr bwMode="auto">
-            <a:xfrm>
-              <a:off x="0" y="12289"/>
-              <a:ext cx="1789" cy="2386"/>
-            </a:xfrm>
-            <a:custGeom>
-              <a:avLst/>
-              <a:gdLst>
-                <a:gd name="T0" fmla="*/ 0 w 1789"/>
-                <a:gd name="T1" fmla="+- 0 12290 12290"/>
-                <a:gd name="T2" fmla="*/ 12290 h 2386"/>
-                <a:gd name="T3" fmla="*/ 0 w 1789"/>
-                <a:gd name="T4" fmla="+- 0 13484 12290"/>
-                <a:gd name="T5" fmla="*/ 13484 h 2386"/>
-                <a:gd name="T6" fmla="*/ 1192 w 1789"/>
-                <a:gd name="T7" fmla="+- 0 14676 12290"/>
-                <a:gd name="T8" fmla="*/ 14676 h 2386"/>
-                <a:gd name="T9" fmla="*/ 1789 w 1789"/>
-                <a:gd name="T10" fmla="+- 0 14079 12290"/>
-                <a:gd name="T11" fmla="*/ 14079 h 2386"/>
-                <a:gd name="T12" fmla="*/ 0 w 1789"/>
-                <a:gd name="T13" fmla="+- 0 12290 12290"/>
-                <a:gd name="T14" fmla="*/ 12290 h 2386"/>
-              </a:gdLst>
-              <a:ahLst/>
-              <a:cxnLst>
-                <a:cxn ang="0">
-                  <a:pos x="T0" y="T2"/>
-                </a:cxn>
-                <a:cxn ang="0">
-                  <a:pos x="T3" y="T5"/>
-                </a:cxn>
-                <a:cxn ang="0">
-                  <a:pos x="T6" y="T8"/>
-                </a:cxn>
-                <a:cxn ang="0">
-                  <a:pos x="T9" y="T11"/>
-                </a:cxn>
-                <a:cxn ang="0">
-                  <a:pos x="T12" y="T14"/>
-                </a:cxn>
-              </a:cxnLst>
-              <a:rect l="0" t="0" r="r" b="b"/>
-              <a:pathLst>
-                <a:path w="1789" h="2386">
-                  <a:moveTo>
-                    <a:pt x="0" y="0"/>
-                  </a:moveTo>
-                  <a:lnTo>
-                    <a:pt x="0" y="1194"/>
-                  </a:lnTo>
-                  <a:lnTo>
-                    <a:pt x="1192" y="2386"/>
-                  </a:lnTo>
-                  <a:lnTo>
-                    <a:pt x="1789" y="1789"/>
-                  </a:lnTo>
-                  <a:lnTo>
-                    <a:pt x="0" y="0"/>
-                  </a:lnTo>
-                  <a:close/>
-                </a:path>
-              </a:pathLst>
-            </a:custGeom>
+          <a:prstGeom prst="straightConnector1">
+            <a:avLst/>
+          </a:prstGeom>
+          <a:ln w="9525" cap="flat" cmpd="sng" algn="ctr">
             <a:solidFill>
-              <a:schemeClr val="accent6"/>
+              <a:schemeClr val="dk1"/>
             </a:solidFill>
-            <a:ln>
-              <a:noFill/>
-            </a:ln>
-            <a:extLst>
-              <a:ext uri="{91240B29-F687-4F45-9708-019B960494DF}">
-                <a14:hiddenLine xmlns:a14="http://schemas.microsoft.com/office/drawing/2010/main" w="9525">
-                  <a:solidFill>
-                    <a:srgbClr val="000000"/>
-                  </a:solidFill>
-                  <a:round/>
-                  <a:headEnd/>
-                  <a:tailEnd/>
-                </a14:hiddenLine>
-              </a:ext>
-            </a:extLst>
-          </p:spPr>
-          <p:txBody>
-            <a:bodyPr rot="0" vert="horz" wrap="square" lIns="91440" tIns="45720" rIns="91440" bIns="45720" anchor="t" anchorCtr="0" upright="1">
-              <a:noAutofit/>
-            </a:bodyPr>
-            <a:lstStyle/>
-            <a:p>
-              <a:endParaRPr lang="en-US" dirty="0"/>
-            </a:p>
-          </p:txBody>
-        </p:sp>
-        <p:sp>
-          <p:nvSpPr>
-            <p:cNvPr id="21" name="Freeform 20">
-              <a:extLst>
-                <a:ext uri="{FF2B5EF4-FFF2-40B4-BE49-F238E27FC236}">
-                  <a16:creationId xmlns:a16="http://schemas.microsoft.com/office/drawing/2014/main" id="{C9EC5ADE-9211-074E-9C66-57F072257780}"/>
-                </a:ext>
-              </a:extLst>
-            </p:cNvPr>
-            <p:cNvSpPr>
-              <a:spLocks/>
-            </p:cNvSpPr>
-            <p:nvPr/>
-          </p:nvSpPr>
-          <p:spPr bwMode="auto">
-            <a:xfrm>
-              <a:off x="0" y="14678"/>
-              <a:ext cx="1162" cy="1162"/>
-            </a:xfrm>
-            <a:custGeom>
-              <a:avLst/>
-              <a:gdLst>
-                <a:gd name="T0" fmla="*/ 0 w 1162"/>
-                <a:gd name="T1" fmla="+- 0 14679 14679"/>
-                <a:gd name="T2" fmla="*/ 14679 h 1162"/>
-                <a:gd name="T3" fmla="*/ 0 w 1162"/>
-                <a:gd name="T4" fmla="+- 0 15840 14679"/>
-                <a:gd name="T5" fmla="*/ 15840 h 1162"/>
-                <a:gd name="T6" fmla="*/ 1161 w 1162"/>
-                <a:gd name="T7" fmla="+- 0 15840 14679"/>
-                <a:gd name="T8" fmla="*/ 15840 h 1162"/>
-                <a:gd name="T9" fmla="*/ 0 w 1162"/>
-                <a:gd name="T10" fmla="+- 0 14679 14679"/>
-                <a:gd name="T11" fmla="*/ 14679 h 1162"/>
-              </a:gdLst>
-              <a:ahLst/>
-              <a:cxnLst>
-                <a:cxn ang="0">
-                  <a:pos x="T0" y="T2"/>
-                </a:cxn>
-                <a:cxn ang="0">
-                  <a:pos x="T3" y="T5"/>
-                </a:cxn>
-                <a:cxn ang="0">
-                  <a:pos x="T6" y="T8"/>
-                </a:cxn>
-                <a:cxn ang="0">
-                  <a:pos x="T9" y="T11"/>
-                </a:cxn>
-              </a:cxnLst>
-              <a:rect l="0" t="0" r="r" b="b"/>
-              <a:pathLst>
-                <a:path w="1162" h="1162">
-                  <a:moveTo>
-                    <a:pt x="0" y="0"/>
-                  </a:moveTo>
-                  <a:lnTo>
-                    <a:pt x="0" y="1161"/>
-                  </a:lnTo>
-                  <a:lnTo>
-                    <a:pt x="1161" y="1161"/>
-                  </a:lnTo>
-                  <a:lnTo>
-                    <a:pt x="0" y="0"/>
-                  </a:lnTo>
-                  <a:close/>
-                </a:path>
-              </a:pathLst>
-            </a:custGeom>
+            <a:prstDash val="solid"/>
+            <a:round/>
+            <a:headEnd type="none" w="med" len="med"/>
+            <a:tailEnd type="arrow" w="med" len="med"/>
+          </a:ln>
+        </p:spPr>
+        <p:style>
+          <a:lnRef idx="0">
+            <a:scrgbClr r="0" g="0" b="0"/>
+          </a:lnRef>
+          <a:fillRef idx="0">
+            <a:scrgbClr r="0" g="0" b="0"/>
+          </a:fillRef>
+          <a:effectRef idx="0">
+            <a:scrgbClr r="0" g="0" b="0"/>
+          </a:effectRef>
+          <a:fontRef idx="minor">
+            <a:schemeClr val="tx1"/>
+          </a:fontRef>
+        </p:style>
+      </p:cxnSp>
+      <p:pic>
+        <p:nvPicPr>
+          <p:cNvPr id="14" name="Picture 13">
+            <a:extLst>
+              <a:ext uri="{FF2B5EF4-FFF2-40B4-BE49-F238E27FC236}">
+                <a16:creationId xmlns:a16="http://schemas.microsoft.com/office/drawing/2014/main" id="{6F7CCED6-F3F5-0D4A-0E68-29127B3BEE41}"/>
+              </a:ext>
+            </a:extLst>
+          </p:cNvPr>
+          <p:cNvPicPr>
+            <a:picLocks noChangeAspect="1"/>
+          </p:cNvPicPr>
+          <p:nvPr/>
+        </p:nvPicPr>
+        <p:blipFill>
+          <a:blip r:embed="rId5">
+            <a:extLst>
+              <a:ext uri="{28A0092B-C50C-407E-A947-70E740481C1C}">
+                <a14:useLocalDpi xmlns:a14="http://schemas.microsoft.com/office/drawing/2010/main" val="0"/>
+              </a:ext>
+            </a:extLst>
+          </a:blip>
+          <a:stretch>
+            <a:fillRect/>
+          </a:stretch>
+        </p:blipFill>
+        <p:spPr>
+          <a:xfrm>
+            <a:off x="209360" y="2974626"/>
+            <a:ext cx="3420177" cy="2050770"/>
+          </a:xfrm>
+          <a:prstGeom prst="rect">
+            <a:avLst/>
+          </a:prstGeom>
+        </p:spPr>
+      </p:pic>
+      <p:pic>
+        <p:nvPicPr>
+          <p:cNvPr id="16" name="Picture 15">
+            <a:extLst>
+              <a:ext uri="{FF2B5EF4-FFF2-40B4-BE49-F238E27FC236}">
+                <a16:creationId xmlns:a16="http://schemas.microsoft.com/office/drawing/2014/main" id="{A1720FC2-4C48-9E14-F879-E7905632CADC}"/>
+              </a:ext>
+            </a:extLst>
+          </p:cNvPr>
+          <p:cNvPicPr>
+            <a:picLocks noChangeAspect="1"/>
+          </p:cNvPicPr>
+          <p:nvPr/>
+        </p:nvPicPr>
+        <p:blipFill>
+          <a:blip r:embed="rId6"/>
+          <a:stretch>
+            <a:fillRect/>
+          </a:stretch>
+        </p:blipFill>
+        <p:spPr>
+          <a:xfrm>
+            <a:off x="4396407" y="820616"/>
+            <a:ext cx="4445001" cy="3179395"/>
+          </a:xfrm>
+          <a:prstGeom prst="rect">
+            <a:avLst/>
+          </a:prstGeom>
+          <a:ln w="12700">
             <a:solidFill>
-              <a:schemeClr val="tx2"/>
+              <a:schemeClr val="bg2">
+                <a:lumMod val="10000"/>
+              </a:schemeClr>
             </a:solidFill>
-            <a:ln>
-              <a:noFill/>
-            </a:ln>
-            <a:extLst>
-              <a:ext uri="{91240B29-F687-4F45-9708-019B960494DF}">
-                <a14:hiddenLine xmlns:a14="http://schemas.microsoft.com/office/drawing/2010/main" w="9525">
-                  <a:solidFill>
-                    <a:srgbClr val="000000"/>
-                  </a:solidFill>
-                  <a:round/>
-                  <a:headEnd/>
-                  <a:tailEnd/>
-                </a14:hiddenLine>
-              </a:ext>
-            </a:extLst>
-          </p:spPr>
-          <p:txBody>
-            <a:bodyPr rot="0" vert="horz" wrap="square" lIns="91440" tIns="45720" rIns="91440" bIns="45720" anchor="t" anchorCtr="0" upright="1">
-              <a:noAutofit/>
-            </a:bodyPr>
-            <a:lstStyle/>
-            <a:p>
-              <a:endParaRPr lang="en-US" dirty="0"/>
-            </a:p>
-          </p:txBody>
-        </p:sp>
-        <p:sp>
-          <p:nvSpPr>
-            <p:cNvPr id="22" name="Freeform 21">
-              <a:extLst>
-                <a:ext uri="{FF2B5EF4-FFF2-40B4-BE49-F238E27FC236}">
-                  <a16:creationId xmlns:a16="http://schemas.microsoft.com/office/drawing/2014/main" id="{7AC879D5-5903-59EE-7539-167CF130993D}"/>
-                </a:ext>
-              </a:extLst>
-            </p:cNvPr>
-            <p:cNvSpPr>
-              <a:spLocks/>
-            </p:cNvSpPr>
-            <p:nvPr/>
-          </p:nvSpPr>
-          <p:spPr bwMode="auto">
-            <a:xfrm>
-              <a:off x="1221" y="14675"/>
-              <a:ext cx="2329" cy="1165"/>
-            </a:xfrm>
-            <a:custGeom>
-              <a:avLst/>
-              <a:gdLst>
-                <a:gd name="T0" fmla="+- 0 3550 1221"/>
-                <a:gd name="T1" fmla="*/ T0 w 2329"/>
-                <a:gd name="T2" fmla="+- 0 15840 14676"/>
-                <a:gd name="T3" fmla="*/ 15840 h 1165"/>
-                <a:gd name="T4" fmla="+- 0 2386 1221"/>
-                <a:gd name="T5" fmla="*/ T4 w 2329"/>
-                <a:gd name="T6" fmla="+- 0 14676 14676"/>
-                <a:gd name="T7" fmla="*/ 14676 h 1165"/>
-                <a:gd name="T8" fmla="+- 0 1221 1221"/>
-                <a:gd name="T9" fmla="*/ T8 w 2329"/>
-                <a:gd name="T10" fmla="+- 0 15840 14676"/>
-                <a:gd name="T11" fmla="*/ 15840 h 1165"/>
-                <a:gd name="T12" fmla="+- 0 3550 1221"/>
-                <a:gd name="T13" fmla="*/ T12 w 2329"/>
-                <a:gd name="T14" fmla="+- 0 15840 14676"/>
-                <a:gd name="T15" fmla="*/ 15840 h 1165"/>
-              </a:gdLst>
-              <a:ahLst/>
-              <a:cxnLst>
-                <a:cxn ang="0">
-                  <a:pos x="T1" y="T3"/>
-                </a:cxn>
-                <a:cxn ang="0">
-                  <a:pos x="T5" y="T7"/>
-                </a:cxn>
-                <a:cxn ang="0">
-                  <a:pos x="T9" y="T11"/>
-                </a:cxn>
-                <a:cxn ang="0">
-                  <a:pos x="T13" y="T15"/>
-                </a:cxn>
-              </a:cxnLst>
-              <a:rect l="0" t="0" r="r" b="b"/>
-              <a:pathLst>
-                <a:path w="2329" h="1165">
-                  <a:moveTo>
-                    <a:pt x="2329" y="1164"/>
-                  </a:moveTo>
-                  <a:lnTo>
-                    <a:pt x="1165" y="0"/>
-                  </a:lnTo>
-                  <a:lnTo>
-                    <a:pt x="0" y="1164"/>
-                  </a:lnTo>
-                  <a:lnTo>
-                    <a:pt x="2329" y="1164"/>
-                  </a:lnTo>
-                </a:path>
-              </a:pathLst>
-            </a:custGeom>
-            <a:solidFill>
-              <a:schemeClr val="accent3"/>
-            </a:solidFill>
-            <a:ln>
-              <a:noFill/>
-            </a:ln>
-            <a:extLst>
-              <a:ext uri="{91240B29-F687-4F45-9708-019B960494DF}">
-                <a14:hiddenLine xmlns:a14="http://schemas.microsoft.com/office/drawing/2010/main" w="9525">
-                  <a:solidFill>
-                    <a:srgbClr val="000000"/>
-                  </a:solidFill>
-                  <a:round/>
-                  <a:headEnd/>
-                  <a:tailEnd/>
-                </a14:hiddenLine>
-              </a:ext>
-            </a:extLst>
-          </p:spPr>
-          <p:txBody>
-            <a:bodyPr rot="0" vert="horz" wrap="square" lIns="91440" tIns="45720" rIns="91440" bIns="45720" anchor="t" anchorCtr="0" upright="1">
-              <a:noAutofit/>
-            </a:bodyPr>
-            <a:lstStyle/>
-            <a:p>
-              <a:endParaRPr lang="en-US" dirty="0"/>
-            </a:p>
-          </p:txBody>
-        </p:sp>
-      </p:grpSp>
+          </a:ln>
+        </p:spPr>
+      </p:pic>
     </p:spTree>
     <p:extLst>
       <p:ext uri="{BB962C8B-B14F-4D97-AF65-F5344CB8AC3E}">
-        <p14:creationId xmlns:p14="http://schemas.microsoft.com/office/powerpoint/2010/main" val="666328216"/>
+        <p14:creationId xmlns:p14="http://schemas.microsoft.com/office/powerpoint/2010/main" val="4153264640"/>
       </p:ext>
     </p:extLst>
   </p:cSld>
@@ -13139,7 +13566,7 @@
         </p:nvSpPr>
         <p:spPr>
           <a:xfrm>
-            <a:off x="6318885" y="3499667"/>
+            <a:off x="6217285" y="3587299"/>
             <a:ext cx="4939666" cy="2542810"/>
           </a:xfrm>
         </p:spPr>
@@ -13245,10 +13672,10 @@
       </p:grpSpPr>
       <p:sp>
         <p:nvSpPr>
-          <p:cNvPr id="2" name="Title 1">
+          <p:cNvPr id="5" name="Title 1">
             <a:extLst>
               <a:ext uri="{FF2B5EF4-FFF2-40B4-BE49-F238E27FC236}">
-                <a16:creationId xmlns:a16="http://schemas.microsoft.com/office/drawing/2014/main" id="{F0759DC4-8B30-98A0-5BAB-C78BA4A4AD55}"/>
+                <a16:creationId xmlns:a16="http://schemas.microsoft.com/office/drawing/2014/main" id="{9BBE6793-EC38-83B7-E66D-E3287495A405}"/>
               </a:ext>
             </a:extLst>
           </p:cNvPr>
@@ -13261,8 +13688,8 @@
         </p:nvSpPr>
         <p:spPr>
           <a:xfrm>
-            <a:off x="594360" y="198408"/>
-            <a:ext cx="10972800" cy="1574317"/>
+            <a:off x="595523" y="142240"/>
+            <a:ext cx="10754360" cy="695765"/>
           </a:xfrm>
         </p:spPr>
         <p:txBody>
@@ -13278,90 +13705,1153 @@
       </p:sp>
       <p:sp>
         <p:nvSpPr>
-          <p:cNvPr id="3" name="Content Placeholder 2">
+          <p:cNvPr id="23" name="TextBox 22">
             <a:extLst>
               <a:ext uri="{FF2B5EF4-FFF2-40B4-BE49-F238E27FC236}">
-                <a16:creationId xmlns:a16="http://schemas.microsoft.com/office/drawing/2014/main" id="{4096FB3A-B62C-3DAB-4FD1-B4EBDD650AEF}"/>
+                <a16:creationId xmlns:a16="http://schemas.microsoft.com/office/drawing/2014/main" id="{432355A2-27C0-3408-F73F-ED471E870FEA}"/>
               </a:ext>
             </a:extLst>
           </p:cNvPr>
-          <p:cNvSpPr>
-            <a:spLocks noGrp="1"/>
-          </p:cNvSpPr>
-          <p:nvPr>
-            <p:ph sz="quarter" idx="13"/>
-          </p:nvPr>
+          <p:cNvSpPr txBox="1"/>
+          <p:nvPr/>
         </p:nvSpPr>
         <p:spPr>
           <a:xfrm>
-            <a:off x="595523" y="2676525"/>
-            <a:ext cx="9873424" cy="3597470"/>
+            <a:off x="191791" y="1252799"/>
+            <a:ext cx="3368842" cy="1477328"/>
           </a:xfrm>
+          <a:prstGeom prst="rect">
+            <a:avLst/>
+          </a:prstGeom>
+          <a:noFill/>
+          <a:ln w="19050">
+            <a:solidFill>
+              <a:schemeClr val="accent1">
+                <a:lumMod val="75000"/>
+              </a:schemeClr>
+            </a:solidFill>
+          </a:ln>
         </p:spPr>
         <p:txBody>
-          <a:bodyPr/>
+          <a:bodyPr wrap="square" rtlCol="0">
+            <a:spAutoFit/>
+          </a:bodyPr>
           <a:lstStyle/>
           <a:p>
-            <a:pPr lvl="1"/>
-            <a:r>
-              <a:rPr lang="en-US" dirty="0"/>
-              <a:t>AI/ML: TensorFlow/</a:t>
-            </a:r>
-            <a:r>
-              <a:rPr lang="en-US" dirty="0" err="1"/>
-              <a:t>PyTorch</a:t>
-            </a:r>
-            <a:r>
-              <a:rPr lang="en-US" dirty="0"/>
-              <a:t>, scikit-learn</a:t>
-            </a:r>
-          </a:p>
-          <a:p>
-            <a:pPr marL="402336" lvl="1" indent="0">
-              <a:buNone/>
+            <a:r>
+              <a:rPr lang="en-IN" b="1" dirty="0">
+                <a:solidFill>
+                  <a:schemeClr val="accent1">
+                    <a:lumMod val="75000"/>
+                  </a:schemeClr>
+                </a:solidFill>
+                <a:latin typeface="Times New Roman" panose="02020603050405020304" pitchFamily="18" charset="0"/>
+                <a:cs typeface="Times New Roman" panose="02020603050405020304" pitchFamily="18" charset="0"/>
+              </a:rPr>
+              <a:t>Frontend</a:t>
+            </a:r>
+            <a:r>
+              <a:rPr lang="en-IN" b="1" dirty="0">
+                <a:latin typeface="Times New Roman" panose="02020603050405020304" pitchFamily="18" charset="0"/>
+                <a:cs typeface="Times New Roman" panose="02020603050405020304" pitchFamily="18" charset="0"/>
+              </a:rPr>
+              <a:t>:</a:t>
+            </a:r>
+          </a:p>
+          <a:p>
+            <a:r>
+              <a:rPr lang="en-IN" dirty="0">
+                <a:solidFill>
+                  <a:schemeClr val="bg1"/>
+                </a:solidFill>
+                <a:latin typeface="Times New Roman" panose="02020603050405020304" pitchFamily="18" charset="0"/>
+                <a:cs typeface="Times New Roman" panose="02020603050405020304" pitchFamily="18" charset="0"/>
+              </a:rPr>
+              <a:t>React</a:t>
+            </a:r>
+          </a:p>
+          <a:p>
+            <a:r>
+              <a:rPr lang="en-IN" dirty="0">
+                <a:solidFill>
+                  <a:schemeClr val="bg1"/>
+                </a:solidFill>
+                <a:latin typeface="Times New Roman" panose="02020603050405020304" pitchFamily="18" charset="0"/>
+                <a:cs typeface="Times New Roman" panose="02020603050405020304" pitchFamily="18" charset="0"/>
+              </a:rPr>
+              <a:t>Typescript</a:t>
+            </a:r>
+          </a:p>
+          <a:p>
+            <a:r>
+              <a:rPr lang="en-IN" dirty="0">
+                <a:solidFill>
+                  <a:schemeClr val="bg1"/>
+                </a:solidFill>
+                <a:latin typeface="Times New Roman" panose="02020603050405020304" pitchFamily="18" charset="0"/>
+                <a:cs typeface="Times New Roman" panose="02020603050405020304" pitchFamily="18" charset="0"/>
+              </a:rPr>
+              <a:t>Tailwind</a:t>
+            </a:r>
+          </a:p>
+          <a:p>
+            <a:r>
+              <a:rPr lang="en-IN" dirty="0">
+                <a:solidFill>
+                  <a:schemeClr val="bg1"/>
+                </a:solidFill>
+                <a:latin typeface="Times New Roman" panose="02020603050405020304" pitchFamily="18" charset="0"/>
+                <a:cs typeface="Times New Roman" panose="02020603050405020304" pitchFamily="18" charset="0"/>
+              </a:rPr>
+              <a:t>Leaflet</a:t>
+            </a:r>
+          </a:p>
+        </p:txBody>
+      </p:sp>
+      <p:pic>
+        <p:nvPicPr>
+          <p:cNvPr id="24" name="Picture 23">
+            <a:extLst>
+              <a:ext uri="{FF2B5EF4-FFF2-40B4-BE49-F238E27FC236}">
+                <a16:creationId xmlns:a16="http://schemas.microsoft.com/office/drawing/2014/main" id="{B6B20E62-F118-07B1-A654-A0FBBED81FC8}"/>
+              </a:ext>
+            </a:extLst>
+          </p:cNvPr>
+          <p:cNvPicPr>
+            <a:picLocks noChangeAspect="1"/>
+          </p:cNvPicPr>
+          <p:nvPr/>
+        </p:nvPicPr>
+        <p:blipFill>
+          <a:blip r:embed="rId2"/>
+          <a:srcRect t="26553" b="25232"/>
+          <a:stretch>
+            <a:fillRect/>
+          </a:stretch>
+        </p:blipFill>
+        <p:spPr>
+          <a:xfrm>
+            <a:off x="1209805" y="1402922"/>
+            <a:ext cx="2272206" cy="511596"/>
+          </a:xfrm>
+          <a:prstGeom prst="rect">
+            <a:avLst/>
+          </a:prstGeom>
+        </p:spPr>
+      </p:pic>
+      <p:pic>
+        <p:nvPicPr>
+          <p:cNvPr id="25" name="Picture 24">
+            <a:extLst>
+              <a:ext uri="{FF2B5EF4-FFF2-40B4-BE49-F238E27FC236}">
+                <a16:creationId xmlns:a16="http://schemas.microsoft.com/office/drawing/2014/main" id="{40EB4E9D-A952-CCFE-D17C-56C9966BAD53}"/>
+              </a:ext>
+            </a:extLst>
+          </p:cNvPr>
+          <p:cNvPicPr>
+            <a:picLocks noChangeAspect="1"/>
+          </p:cNvPicPr>
+          <p:nvPr/>
+        </p:nvPicPr>
+        <p:blipFill>
+          <a:blip r:embed="rId3">
+            <a:extLst>
+              <a:ext uri="{28A0092B-C50C-407E-A947-70E740481C1C}">
+                <a14:useLocalDpi xmlns:a14="http://schemas.microsoft.com/office/drawing/2010/main" val="0"/>
+              </a:ext>
+            </a:extLst>
+          </a:blip>
+          <a:stretch>
+            <a:fillRect/>
+          </a:stretch>
+        </p:blipFill>
+        <p:spPr>
+          <a:xfrm>
+            <a:off x="1300433" y="1991404"/>
+            <a:ext cx="490697" cy="490697"/>
+          </a:xfrm>
+          <a:prstGeom prst="rect">
+            <a:avLst/>
+          </a:prstGeom>
+        </p:spPr>
+      </p:pic>
+      <p:pic>
+        <p:nvPicPr>
+          <p:cNvPr id="26" name="Picture 25">
+            <a:extLst>
+              <a:ext uri="{FF2B5EF4-FFF2-40B4-BE49-F238E27FC236}">
+                <a16:creationId xmlns:a16="http://schemas.microsoft.com/office/drawing/2014/main" id="{10C11C71-6420-094C-1ECC-5CE18ADBD026}"/>
+              </a:ext>
+            </a:extLst>
+          </p:cNvPr>
+          <p:cNvPicPr>
+            <a:picLocks noChangeAspect="1"/>
+          </p:cNvPicPr>
+          <p:nvPr/>
+        </p:nvPicPr>
+        <p:blipFill>
+          <a:blip r:embed="rId4"/>
+          <a:stretch>
+            <a:fillRect/>
+          </a:stretch>
+        </p:blipFill>
+        <p:spPr>
+          <a:xfrm>
+            <a:off x="1884653" y="1823983"/>
+            <a:ext cx="792882" cy="792882"/>
+          </a:xfrm>
+          <a:prstGeom prst="rect">
+            <a:avLst/>
+          </a:prstGeom>
+        </p:spPr>
+      </p:pic>
+      <p:sp>
+        <p:nvSpPr>
+          <p:cNvPr id="27" name="TextBox 26">
+            <a:extLst>
+              <a:ext uri="{FF2B5EF4-FFF2-40B4-BE49-F238E27FC236}">
+                <a16:creationId xmlns:a16="http://schemas.microsoft.com/office/drawing/2014/main" id="{5224DB5C-37D6-8856-07D7-5084881F0861}"/>
+              </a:ext>
+            </a:extLst>
+          </p:cNvPr>
+          <p:cNvSpPr txBox="1"/>
+          <p:nvPr/>
+        </p:nvSpPr>
+        <p:spPr>
+          <a:xfrm>
+            <a:off x="370550" y="2963996"/>
+            <a:ext cx="3368842" cy="1200329"/>
+          </a:xfrm>
+          <a:prstGeom prst="rect">
+            <a:avLst/>
+          </a:prstGeom>
+          <a:noFill/>
+          <a:ln w="19050">
+            <a:solidFill>
+              <a:srgbClr val="FF0000"/>
+            </a:solidFill>
+          </a:ln>
+        </p:spPr>
+        <p:txBody>
+          <a:bodyPr wrap="square" rtlCol="0">
+            <a:spAutoFit/>
+          </a:bodyPr>
+          <a:lstStyle/>
+          <a:p>
+            <a:r>
+              <a:rPr lang="en-IN" b="1" dirty="0">
+                <a:solidFill>
+                  <a:srgbClr val="FF0000"/>
+                </a:solidFill>
+                <a:latin typeface="Times New Roman" panose="02020603050405020304" pitchFamily="18" charset="0"/>
+                <a:cs typeface="Times New Roman" panose="02020603050405020304" pitchFamily="18" charset="0"/>
+              </a:rPr>
+              <a:t>Backend</a:t>
+            </a:r>
+            <a:r>
+              <a:rPr lang="en-IN" b="1" dirty="0">
+                <a:latin typeface="Times New Roman" panose="02020603050405020304" pitchFamily="18" charset="0"/>
+                <a:cs typeface="Times New Roman" panose="02020603050405020304" pitchFamily="18" charset="0"/>
+              </a:rPr>
+              <a:t>:</a:t>
+            </a:r>
+          </a:p>
+          <a:p>
+            <a:r>
+              <a:rPr lang="en-IN" dirty="0" err="1">
+                <a:solidFill>
+                  <a:schemeClr val="bg1"/>
+                </a:solidFill>
+                <a:latin typeface="Times New Roman" panose="02020603050405020304" pitchFamily="18" charset="0"/>
+                <a:cs typeface="Times New Roman" panose="02020603050405020304" pitchFamily="18" charset="0"/>
+              </a:rPr>
+              <a:t>FastAPI</a:t>
+            </a:r>
+            <a:endParaRPr lang="en-IN" dirty="0">
+              <a:solidFill>
+                <a:schemeClr val="bg1"/>
+              </a:solidFill>
+              <a:latin typeface="Times New Roman" panose="02020603050405020304" pitchFamily="18" charset="0"/>
+              <a:cs typeface="Times New Roman" panose="02020603050405020304" pitchFamily="18" charset="0"/>
+            </a:endParaRPr>
+          </a:p>
+          <a:p>
+            <a:r>
+              <a:rPr lang="en-IN" dirty="0">
+                <a:solidFill>
+                  <a:schemeClr val="bg1"/>
+                </a:solidFill>
+                <a:latin typeface="Times New Roman" panose="02020603050405020304" pitchFamily="18" charset="0"/>
+                <a:cs typeface="Times New Roman" panose="02020603050405020304" pitchFamily="18" charset="0"/>
+              </a:rPr>
+              <a:t>Celery</a:t>
+            </a:r>
+          </a:p>
+          <a:p>
+            <a:r>
+              <a:rPr lang="en-IN" dirty="0">
+                <a:solidFill>
+                  <a:schemeClr val="bg1"/>
+                </a:solidFill>
+                <a:latin typeface="Times New Roman" panose="02020603050405020304" pitchFamily="18" charset="0"/>
+                <a:cs typeface="Times New Roman" panose="02020603050405020304" pitchFamily="18" charset="0"/>
+              </a:rPr>
+              <a:t>Redis</a:t>
+            </a:r>
+          </a:p>
+        </p:txBody>
+      </p:sp>
+      <p:pic>
+        <p:nvPicPr>
+          <p:cNvPr id="28" name="Picture 27">
+            <a:extLst>
+              <a:ext uri="{FF2B5EF4-FFF2-40B4-BE49-F238E27FC236}">
+                <a16:creationId xmlns:a16="http://schemas.microsoft.com/office/drawing/2014/main" id="{1F9B4410-69B8-EDC4-A915-DB45BEAC3F2E}"/>
+              </a:ext>
+            </a:extLst>
+          </p:cNvPr>
+          <p:cNvPicPr>
+            <a:picLocks noChangeAspect="1"/>
+          </p:cNvPicPr>
+          <p:nvPr/>
+        </p:nvPicPr>
+        <p:blipFill>
+          <a:blip r:embed="rId5">
+            <a:extLst>
+              <a:ext uri="{28A0092B-C50C-407E-A947-70E740481C1C}">
+                <a14:useLocalDpi xmlns:a14="http://schemas.microsoft.com/office/drawing/2010/main" val="0"/>
+              </a:ext>
+            </a:extLst>
+          </a:blip>
+          <a:stretch>
+            <a:fillRect/>
+          </a:stretch>
+        </p:blipFill>
+        <p:spPr>
+          <a:xfrm>
+            <a:off x="1621928" y="3174776"/>
+            <a:ext cx="656349" cy="656349"/>
+          </a:xfrm>
+          <a:prstGeom prst="rect">
+            <a:avLst/>
+          </a:prstGeom>
+        </p:spPr>
+      </p:pic>
+      <p:pic>
+        <p:nvPicPr>
+          <p:cNvPr id="29" name="Picture 28">
+            <a:extLst>
+              <a:ext uri="{FF2B5EF4-FFF2-40B4-BE49-F238E27FC236}">
+                <a16:creationId xmlns:a16="http://schemas.microsoft.com/office/drawing/2014/main" id="{AC7730C6-BC22-AA97-2B03-8B8011500FA8}"/>
+              </a:ext>
+            </a:extLst>
+          </p:cNvPr>
+          <p:cNvPicPr>
+            <a:picLocks noChangeAspect="1"/>
+          </p:cNvPicPr>
+          <p:nvPr/>
+        </p:nvPicPr>
+        <p:blipFill>
+          <a:blip r:embed="rId6"/>
+          <a:stretch>
+            <a:fillRect/>
+          </a:stretch>
+        </p:blipFill>
+        <p:spPr>
+          <a:xfrm>
+            <a:off x="2600857" y="3513682"/>
+            <a:ext cx="732924" cy="732924"/>
+          </a:xfrm>
+          <a:prstGeom prst="rect">
+            <a:avLst/>
+          </a:prstGeom>
+        </p:spPr>
+      </p:pic>
+      <p:pic>
+        <p:nvPicPr>
+          <p:cNvPr id="30" name="Picture 29">
+            <a:extLst>
+              <a:ext uri="{FF2B5EF4-FFF2-40B4-BE49-F238E27FC236}">
+                <a16:creationId xmlns:a16="http://schemas.microsoft.com/office/drawing/2014/main" id="{E7D7BC7A-B695-11F8-8F42-73F919CE22AF}"/>
+              </a:ext>
+            </a:extLst>
+          </p:cNvPr>
+          <p:cNvPicPr>
+            <a:picLocks noChangeAspect="1"/>
+          </p:cNvPicPr>
+          <p:nvPr/>
+        </p:nvPicPr>
+        <p:blipFill>
+          <a:blip r:embed="rId7"/>
+          <a:stretch>
+            <a:fillRect/>
+          </a:stretch>
+        </p:blipFill>
+        <p:spPr>
+          <a:xfrm>
+            <a:off x="2600857" y="3025763"/>
+            <a:ext cx="732924" cy="629625"/>
+          </a:xfrm>
+          <a:prstGeom prst="rect">
+            <a:avLst/>
+          </a:prstGeom>
+        </p:spPr>
+      </p:pic>
+      <p:sp>
+        <p:nvSpPr>
+          <p:cNvPr id="31" name="TextBox 30">
+            <a:extLst>
+              <a:ext uri="{FF2B5EF4-FFF2-40B4-BE49-F238E27FC236}">
+                <a16:creationId xmlns:a16="http://schemas.microsoft.com/office/drawing/2014/main" id="{20A9F7CB-00AD-7A66-9B54-7F60E16FE588}"/>
+              </a:ext>
+            </a:extLst>
+          </p:cNvPr>
+          <p:cNvSpPr txBox="1"/>
+          <p:nvPr/>
+        </p:nvSpPr>
+        <p:spPr>
+          <a:xfrm>
+            <a:off x="3918150" y="1559022"/>
+            <a:ext cx="2161821" cy="923330"/>
+          </a:xfrm>
+          <a:prstGeom prst="rect">
+            <a:avLst/>
+          </a:prstGeom>
+          <a:noFill/>
+          <a:ln w="19050">
+            <a:solidFill>
+              <a:schemeClr val="accent4">
+                <a:lumMod val="75000"/>
+              </a:schemeClr>
+            </a:solidFill>
+          </a:ln>
+        </p:spPr>
+        <p:txBody>
+          <a:bodyPr wrap="square" rtlCol="0">
+            <a:spAutoFit/>
+          </a:bodyPr>
+          <a:lstStyle/>
+          <a:p>
+            <a:r>
+              <a:rPr lang="en-IN" b="1" dirty="0">
+                <a:solidFill>
+                  <a:schemeClr val="accent4">
+                    <a:lumMod val="75000"/>
+                  </a:schemeClr>
+                </a:solidFill>
+                <a:latin typeface="Times New Roman" panose="02020603050405020304" pitchFamily="18" charset="0"/>
+                <a:cs typeface="Times New Roman" panose="02020603050405020304" pitchFamily="18" charset="0"/>
+              </a:rPr>
+              <a:t>Database</a:t>
+            </a:r>
+            <a:r>
+              <a:rPr lang="en-IN" b="1" dirty="0">
+                <a:latin typeface="Times New Roman" panose="02020603050405020304" pitchFamily="18" charset="0"/>
+                <a:cs typeface="Times New Roman" panose="02020603050405020304" pitchFamily="18" charset="0"/>
+              </a:rPr>
+              <a:t>:</a:t>
+            </a:r>
+          </a:p>
+          <a:p>
+            <a:r>
+              <a:rPr lang="en-IN" dirty="0">
+                <a:solidFill>
+                  <a:schemeClr val="bg1"/>
+                </a:solidFill>
+                <a:latin typeface="Times New Roman" panose="02020603050405020304" pitchFamily="18" charset="0"/>
+                <a:cs typeface="Times New Roman" panose="02020603050405020304" pitchFamily="18" charset="0"/>
+              </a:rPr>
+              <a:t>MongoDB</a:t>
+            </a:r>
+          </a:p>
+          <a:p>
+            <a:r>
+              <a:rPr lang="en-IN" dirty="0">
+                <a:solidFill>
+                  <a:schemeClr val="bg1"/>
+                </a:solidFill>
+                <a:latin typeface="Times New Roman" panose="02020603050405020304" pitchFamily="18" charset="0"/>
+                <a:cs typeface="Times New Roman" panose="02020603050405020304" pitchFamily="18" charset="0"/>
+              </a:rPr>
+              <a:t>Redis</a:t>
+            </a:r>
+          </a:p>
+        </p:txBody>
+      </p:sp>
+      <p:pic>
+        <p:nvPicPr>
+          <p:cNvPr id="32" name="Picture 31">
+            <a:extLst>
+              <a:ext uri="{FF2B5EF4-FFF2-40B4-BE49-F238E27FC236}">
+                <a16:creationId xmlns:a16="http://schemas.microsoft.com/office/drawing/2014/main" id="{5507B663-2403-E007-D364-4B07DE8A09E2}"/>
+              </a:ext>
+            </a:extLst>
+          </p:cNvPr>
+          <p:cNvPicPr>
+            <a:picLocks noChangeAspect="1"/>
+          </p:cNvPicPr>
+          <p:nvPr/>
+        </p:nvPicPr>
+        <p:blipFill>
+          <a:blip r:embed="rId8"/>
+          <a:stretch>
+            <a:fillRect/>
+          </a:stretch>
+        </p:blipFill>
+        <p:spPr>
+          <a:xfrm>
+            <a:off x="5124188" y="1646182"/>
+            <a:ext cx="687454" cy="687454"/>
+          </a:xfrm>
+          <a:prstGeom prst="rect">
+            <a:avLst/>
+          </a:prstGeom>
+        </p:spPr>
+      </p:pic>
+      <p:pic>
+        <p:nvPicPr>
+          <p:cNvPr id="33" name="Picture 32">
+            <a:extLst>
+              <a:ext uri="{FF2B5EF4-FFF2-40B4-BE49-F238E27FC236}">
+                <a16:creationId xmlns:a16="http://schemas.microsoft.com/office/drawing/2014/main" id="{3F2C1E6F-2303-173F-2C72-1B03D7878E34}"/>
+              </a:ext>
+            </a:extLst>
+          </p:cNvPr>
+          <p:cNvPicPr>
+            <a:picLocks noChangeAspect="1"/>
+          </p:cNvPicPr>
+          <p:nvPr/>
+        </p:nvPicPr>
+        <p:blipFill>
+          <a:blip r:embed="rId9"/>
+          <a:stretch>
+            <a:fillRect/>
+          </a:stretch>
+        </p:blipFill>
+        <p:spPr>
+          <a:xfrm>
+            <a:off x="2758581" y="1840311"/>
+            <a:ext cx="792882" cy="792882"/>
+          </a:xfrm>
+          <a:prstGeom prst="rect">
+            <a:avLst/>
+          </a:prstGeom>
+        </p:spPr>
+      </p:pic>
+      <p:sp>
+        <p:nvSpPr>
+          <p:cNvPr id="34" name="TextBox 33">
+            <a:extLst>
+              <a:ext uri="{FF2B5EF4-FFF2-40B4-BE49-F238E27FC236}">
+                <a16:creationId xmlns:a16="http://schemas.microsoft.com/office/drawing/2014/main" id="{CADB117F-FA7A-9162-CED3-7EE1DABDE484}"/>
+              </a:ext>
+            </a:extLst>
+          </p:cNvPr>
+          <p:cNvSpPr txBox="1"/>
+          <p:nvPr/>
+        </p:nvSpPr>
+        <p:spPr>
+          <a:xfrm>
+            <a:off x="3967637" y="2931771"/>
+            <a:ext cx="2161821" cy="923330"/>
+          </a:xfrm>
+          <a:prstGeom prst="rect">
+            <a:avLst/>
+          </a:prstGeom>
+          <a:noFill/>
+          <a:ln w="19050">
+            <a:solidFill>
+              <a:schemeClr val="accent6">
+                <a:lumMod val="50000"/>
+              </a:schemeClr>
+            </a:solidFill>
+          </a:ln>
+        </p:spPr>
+        <p:txBody>
+          <a:bodyPr wrap="square" rtlCol="0">
+            <a:spAutoFit/>
+          </a:bodyPr>
+          <a:lstStyle/>
+          <a:p>
+            <a:r>
+              <a:rPr lang="en-IN" b="1" dirty="0">
+                <a:solidFill>
+                  <a:schemeClr val="accent6">
+                    <a:lumMod val="50000"/>
+                  </a:schemeClr>
+                </a:solidFill>
+                <a:latin typeface="Times New Roman" panose="02020603050405020304" pitchFamily="18" charset="0"/>
+                <a:cs typeface="Times New Roman" panose="02020603050405020304" pitchFamily="18" charset="0"/>
+              </a:rPr>
+              <a:t>Notifications</a:t>
+            </a:r>
+            <a:r>
+              <a:rPr lang="en-IN" b="1" dirty="0">
+                <a:latin typeface="Times New Roman" panose="02020603050405020304" pitchFamily="18" charset="0"/>
+                <a:cs typeface="Times New Roman" panose="02020603050405020304" pitchFamily="18" charset="0"/>
+              </a:rPr>
+              <a:t>:</a:t>
+            </a:r>
+          </a:p>
+          <a:p>
+            <a:r>
+              <a:rPr lang="en-IN" dirty="0">
+                <a:solidFill>
+                  <a:schemeClr val="bg1"/>
+                </a:solidFill>
+                <a:latin typeface="Times New Roman" panose="02020603050405020304" pitchFamily="18" charset="0"/>
+                <a:cs typeface="Times New Roman" panose="02020603050405020304" pitchFamily="18" charset="0"/>
+              </a:rPr>
+              <a:t>Twilio,</a:t>
+            </a:r>
+          </a:p>
+          <a:p>
+            <a:r>
+              <a:rPr lang="en-IN" dirty="0">
+                <a:solidFill>
+                  <a:schemeClr val="bg1"/>
+                </a:solidFill>
+                <a:latin typeface="Times New Roman" panose="02020603050405020304" pitchFamily="18" charset="0"/>
+                <a:cs typeface="Times New Roman" panose="02020603050405020304" pitchFamily="18" charset="0"/>
+              </a:rPr>
+              <a:t>SendGrid</a:t>
+            </a:r>
+          </a:p>
+        </p:txBody>
+      </p:sp>
+      <p:pic>
+        <p:nvPicPr>
+          <p:cNvPr id="35" name="Picture 34">
+            <a:extLst>
+              <a:ext uri="{FF2B5EF4-FFF2-40B4-BE49-F238E27FC236}">
+                <a16:creationId xmlns:a16="http://schemas.microsoft.com/office/drawing/2014/main" id="{3AA6A9D7-D309-BF7C-9E50-FE5A53CA327A}"/>
+              </a:ext>
+            </a:extLst>
+          </p:cNvPr>
+          <p:cNvPicPr>
+            <a:picLocks noChangeAspect="1"/>
+          </p:cNvPicPr>
+          <p:nvPr/>
+        </p:nvPicPr>
+        <p:blipFill>
+          <a:blip r:embed="rId10"/>
+          <a:stretch>
+            <a:fillRect/>
+          </a:stretch>
+        </p:blipFill>
+        <p:spPr>
+          <a:xfrm>
+            <a:off x="5089489" y="2785285"/>
+            <a:ext cx="1179665" cy="1179665"/>
+          </a:xfrm>
+          <a:prstGeom prst="rect">
+            <a:avLst/>
+          </a:prstGeom>
+        </p:spPr>
+      </p:pic>
+      <p:sp>
+        <p:nvSpPr>
+          <p:cNvPr id="36" name="TextBox 35">
+            <a:extLst>
+              <a:ext uri="{FF2B5EF4-FFF2-40B4-BE49-F238E27FC236}">
+                <a16:creationId xmlns:a16="http://schemas.microsoft.com/office/drawing/2014/main" id="{51F3AAD3-B598-8B3A-C6DE-51D39808AC2F}"/>
+              </a:ext>
+            </a:extLst>
+          </p:cNvPr>
+          <p:cNvSpPr txBox="1"/>
+          <p:nvPr/>
+        </p:nvSpPr>
+        <p:spPr>
+          <a:xfrm>
+            <a:off x="6308216" y="551289"/>
+            <a:ext cx="5443905" cy="5755422"/>
+          </a:xfrm>
+          <a:prstGeom prst="rect">
+            <a:avLst/>
+          </a:prstGeom>
+          <a:noFill/>
+          <a:ln w="19050">
+            <a:solidFill>
+              <a:schemeClr val="tx2">
+                <a:lumMod val="10000"/>
+              </a:schemeClr>
+            </a:solidFill>
+          </a:ln>
+        </p:spPr>
+        <p:txBody>
+          <a:bodyPr wrap="square" rtlCol="0">
+            <a:spAutoFit/>
+          </a:bodyPr>
+          <a:lstStyle/>
+          <a:p>
+            <a:r>
+              <a:rPr lang="en-IN" sz="1600" b="1" dirty="0">
+                <a:solidFill>
+                  <a:schemeClr val="bg1"/>
+                </a:solidFill>
+                <a:latin typeface="Times New Roman" panose="02020603050405020304" pitchFamily="18" charset="0"/>
+                <a:cs typeface="Times New Roman" panose="02020603050405020304" pitchFamily="18" charset="0"/>
+              </a:rPr>
+              <a:t>Satellite and Analysis:</a:t>
+            </a:r>
+          </a:p>
+          <a:p>
+            <a:pPr marL="285750" indent="-285750">
+              <a:buFont typeface="Arial" panose="020B0604020202020204" pitchFamily="34" charset="0"/>
+              <a:buChar char="•"/>
             </a:pPr>
-            <a:endParaRPr lang="en-US" dirty="0"/>
-          </a:p>
-          <a:p>
-            <a:pPr lvl="1"/>
-            <a:r>
-              <a:rPr lang="en-US" dirty="0"/>
-              <a:t>Data pipeline: Python, Apache Kafka</a:t>
-            </a:r>
-          </a:p>
-          <a:p>
-            <a:pPr lvl="1"/>
-            <a:endParaRPr lang="en-US" dirty="0"/>
-          </a:p>
-          <a:p>
-            <a:pPr lvl="1"/>
-            <a:r>
-              <a:rPr lang="en-US" dirty="0"/>
-              <a:t>Visualization: React, D3.js, </a:t>
-            </a:r>
-            <a:r>
-              <a:rPr lang="en-US" dirty="0" err="1"/>
-              <a:t>Mapbox</a:t>
-            </a:r>
-            <a:endParaRPr lang="en-US" dirty="0"/>
-          </a:p>
-          <a:p>
-            <a:pPr lvl="1"/>
-            <a:endParaRPr lang="en-US" dirty="0"/>
-          </a:p>
-          <a:p>
-            <a:pPr lvl="1"/>
-            <a:r>
-              <a:rPr lang="en-US" dirty="0"/>
-              <a:t>Notification: Twilio, Firebase, SMS gateways</a:t>
-            </a:r>
+            <a:r>
+              <a:rPr lang="en-IN" sz="1600" b="1" dirty="0">
+                <a:solidFill>
+                  <a:schemeClr val="bg1"/>
+                </a:solidFill>
+                <a:latin typeface="Times New Roman" panose="02020603050405020304" pitchFamily="18" charset="0"/>
+                <a:cs typeface="Times New Roman" panose="02020603050405020304" pitchFamily="18" charset="0"/>
+              </a:rPr>
+              <a:t>Prototype</a:t>
+            </a:r>
+            <a:r>
+              <a:rPr lang="en-IN" sz="1600" b="1" dirty="0">
+                <a:solidFill>
+                  <a:schemeClr val="bg1"/>
+                </a:solidFill>
+                <a:latin typeface="Times New Roman" panose="02020603050405020304" pitchFamily="18" charset="0"/>
+                <a:cs typeface="Times New Roman" panose="02020603050405020304" pitchFamily="18" charset="0"/>
+                <a:sym typeface="Wingdings" panose="05000000000000000000" pitchFamily="2" charset="2"/>
+              </a:rPr>
+              <a:t> (Google Earth Engine)</a:t>
+            </a:r>
+            <a:endParaRPr lang="en-IN" sz="1600" b="1" dirty="0">
+              <a:solidFill>
+                <a:schemeClr val="bg1"/>
+              </a:solidFill>
+              <a:latin typeface="Times New Roman" panose="02020603050405020304" pitchFamily="18" charset="0"/>
+              <a:cs typeface="Times New Roman" panose="02020603050405020304" pitchFamily="18" charset="0"/>
+            </a:endParaRPr>
+          </a:p>
+          <a:p>
+            <a:r>
+              <a:rPr lang="en-US" sz="1600" dirty="0">
+                <a:solidFill>
+                  <a:schemeClr val="bg1"/>
+                </a:solidFill>
+              </a:rPr>
+              <a:t>A cloud-based geospatial analysis platform. Fetches and processes satellite imagery (e.g., Sentinel-2, Landsat) to detect changes in AOIs using advanced algorithms.</a:t>
+            </a:r>
+            <a:endParaRPr lang="en-US" sz="1600" dirty="0">
+              <a:solidFill>
+                <a:schemeClr val="bg1"/>
+              </a:solidFill>
+              <a:latin typeface="Times New Roman" panose="02020603050405020304" pitchFamily="18" charset="0"/>
+              <a:cs typeface="Times New Roman" panose="02020603050405020304" pitchFamily="18" charset="0"/>
+            </a:endParaRPr>
+          </a:p>
+          <a:p>
+            <a:pPr marL="285750" indent="-285750">
+              <a:buFont typeface="Arial" panose="020B0604020202020204" pitchFamily="34" charset="0"/>
+              <a:buChar char="•"/>
+            </a:pPr>
+            <a:r>
+              <a:rPr lang="en-US" sz="1600" b="1" dirty="0">
+                <a:solidFill>
+                  <a:schemeClr val="bg1"/>
+                </a:solidFill>
+                <a:latin typeface="Times New Roman" panose="02020603050405020304" pitchFamily="18" charset="0"/>
+                <a:cs typeface="Times New Roman" panose="02020603050405020304" pitchFamily="18" charset="0"/>
+              </a:rPr>
+              <a:t>ML Implementation (Static Working):</a:t>
+            </a:r>
+          </a:p>
+          <a:p>
+            <a:r>
+              <a:rPr lang="en-IN" sz="1600" dirty="0">
+                <a:solidFill>
+                  <a:schemeClr val="bg1"/>
+                </a:solidFill>
+              </a:rPr>
+              <a:t>1. Data Acquisition</a:t>
+            </a:r>
+            <a:br>
+              <a:rPr lang="en-IN" sz="1600" dirty="0">
+                <a:solidFill>
+                  <a:schemeClr val="bg1"/>
+                </a:solidFill>
+              </a:rPr>
+            </a:br>
+            <a:r>
+              <a:rPr lang="en-IN" sz="1600" dirty="0">
+                <a:solidFill>
+                  <a:schemeClr val="bg1"/>
+                </a:solidFill>
+              </a:rPr>
+              <a:t> • ISRO LISS-4 (Bands 2, 3, 4: Green, Red, NIR)</a:t>
+            </a:r>
+            <a:br>
+              <a:rPr lang="en-IN" sz="1600" dirty="0">
+                <a:solidFill>
+                  <a:schemeClr val="bg1"/>
+                </a:solidFill>
+              </a:rPr>
+            </a:br>
+            <a:r>
+              <a:rPr lang="en-IN" sz="1600" dirty="0">
+                <a:solidFill>
+                  <a:schemeClr val="bg1"/>
+                </a:solidFill>
+              </a:rPr>
+              <a:t> • Source: </a:t>
+            </a:r>
+            <a:r>
+              <a:rPr lang="en-IN" sz="1600" dirty="0" err="1">
+                <a:solidFill>
+                  <a:schemeClr val="bg1"/>
+                </a:solidFill>
+              </a:rPr>
+              <a:t>Bhoonidhi</a:t>
+            </a:r>
+            <a:r>
+              <a:rPr lang="en-IN" sz="1600" dirty="0">
+                <a:solidFill>
+                  <a:schemeClr val="bg1"/>
+                </a:solidFill>
+              </a:rPr>
+              <a:t> (</a:t>
+            </a:r>
+            <a:r>
+              <a:rPr lang="en-IN" sz="1600" dirty="0" err="1">
+                <a:solidFill>
+                  <a:schemeClr val="bg1"/>
+                </a:solidFill>
+              </a:rPr>
+              <a:t>GeoTIFF</a:t>
+            </a:r>
+            <a:r>
+              <a:rPr lang="en-IN" sz="1600" dirty="0">
+                <a:solidFill>
+                  <a:schemeClr val="bg1"/>
+                </a:solidFill>
+              </a:rPr>
+              <a:t>, Multi-temporal – T1 &amp; T2)</a:t>
+            </a:r>
+          </a:p>
+          <a:p>
+            <a:r>
+              <a:rPr lang="en-IN" sz="1600" dirty="0">
+                <a:solidFill>
+                  <a:schemeClr val="bg1"/>
+                </a:solidFill>
+              </a:rPr>
+              <a:t>2. AOI Handling</a:t>
+            </a:r>
+            <a:br>
+              <a:rPr lang="en-IN" sz="1600" dirty="0">
+                <a:solidFill>
+                  <a:schemeClr val="bg1"/>
+                </a:solidFill>
+              </a:rPr>
+            </a:br>
+            <a:r>
+              <a:rPr lang="en-IN" sz="1600" dirty="0">
+                <a:solidFill>
+                  <a:schemeClr val="bg1"/>
+                </a:solidFill>
+              </a:rPr>
+              <a:t> • User-defined GeoJSON from frontend</a:t>
+            </a:r>
+            <a:br>
+              <a:rPr lang="en-IN" sz="1600" dirty="0">
+                <a:solidFill>
+                  <a:schemeClr val="bg1"/>
+                </a:solidFill>
+              </a:rPr>
+            </a:br>
+            <a:r>
+              <a:rPr lang="en-IN" sz="1600" dirty="0">
+                <a:solidFill>
+                  <a:schemeClr val="bg1"/>
+                </a:solidFill>
+              </a:rPr>
+              <a:t> • Stored in MongoDB</a:t>
+            </a:r>
+            <a:br>
+              <a:rPr lang="en-IN" sz="1600" dirty="0">
+                <a:solidFill>
+                  <a:schemeClr val="bg1"/>
+                </a:solidFill>
+              </a:rPr>
+            </a:br>
+            <a:r>
+              <a:rPr lang="en-IN" sz="1600" dirty="0">
+                <a:solidFill>
+                  <a:schemeClr val="bg1"/>
+                </a:solidFill>
+              </a:rPr>
+              <a:t> • Used for raster clipping</a:t>
+            </a:r>
+          </a:p>
+          <a:p>
+            <a:r>
+              <a:rPr lang="en-IN" sz="1600" dirty="0">
+                <a:solidFill>
+                  <a:schemeClr val="bg1"/>
+                </a:solidFill>
+              </a:rPr>
+              <a:t>3. Image Preprocessing</a:t>
+            </a:r>
+            <a:br>
+              <a:rPr lang="en-IN" sz="1600" dirty="0">
+                <a:solidFill>
+                  <a:schemeClr val="bg1"/>
+                </a:solidFill>
+              </a:rPr>
+            </a:br>
+            <a:r>
+              <a:rPr lang="en-IN" sz="1600" dirty="0">
+                <a:solidFill>
+                  <a:schemeClr val="bg1"/>
+                </a:solidFill>
+              </a:rPr>
+              <a:t> • Tools: </a:t>
+            </a:r>
+            <a:r>
+              <a:rPr lang="en-IN" sz="1600" dirty="0" err="1">
+                <a:solidFill>
+                  <a:schemeClr val="bg1"/>
+                </a:solidFill>
+              </a:rPr>
+              <a:t>rasterio</a:t>
+            </a:r>
+            <a:r>
+              <a:rPr lang="en-IN" sz="1600" dirty="0">
+                <a:solidFill>
+                  <a:schemeClr val="bg1"/>
+                </a:solidFill>
+              </a:rPr>
+              <a:t>, </a:t>
+            </a:r>
+            <a:r>
+              <a:rPr lang="en-IN" sz="1600" dirty="0" err="1">
+                <a:solidFill>
+                  <a:schemeClr val="bg1"/>
+                </a:solidFill>
+              </a:rPr>
+              <a:t>geopandas</a:t>
+            </a:r>
+            <a:r>
+              <a:rPr lang="en-IN" sz="1600" dirty="0">
+                <a:solidFill>
+                  <a:schemeClr val="bg1"/>
+                </a:solidFill>
+              </a:rPr>
+              <a:t>, </a:t>
+            </a:r>
+            <a:r>
+              <a:rPr lang="en-IN" sz="1600" dirty="0" err="1">
+                <a:solidFill>
+                  <a:schemeClr val="bg1"/>
+                </a:solidFill>
+              </a:rPr>
+              <a:t>numpy</a:t>
+            </a:r>
+            <a:br>
+              <a:rPr lang="en-IN" sz="1600" dirty="0">
+                <a:solidFill>
+                  <a:schemeClr val="bg1"/>
+                </a:solidFill>
+              </a:rPr>
+            </a:br>
+            <a:r>
+              <a:rPr lang="en-IN" sz="1600" dirty="0">
+                <a:solidFill>
+                  <a:schemeClr val="bg1"/>
+                </a:solidFill>
+              </a:rPr>
+              <a:t> • Clipping, Normalization, Basic Cloud Masking</a:t>
+            </a:r>
+          </a:p>
+          <a:p>
+            <a:r>
+              <a:rPr lang="en-IN" sz="1600" dirty="0">
+                <a:solidFill>
+                  <a:schemeClr val="bg1"/>
+                </a:solidFill>
+              </a:rPr>
+              <a:t>4. Change Detection</a:t>
+            </a:r>
+            <a:br>
+              <a:rPr lang="en-IN" sz="1600" dirty="0">
+                <a:solidFill>
+                  <a:schemeClr val="bg1"/>
+                </a:solidFill>
+              </a:rPr>
+            </a:br>
+            <a:r>
+              <a:rPr lang="en-IN" sz="1600" dirty="0">
+                <a:solidFill>
+                  <a:schemeClr val="bg1"/>
+                </a:solidFill>
+              </a:rPr>
+              <a:t> • NDVI Calculation &amp; Differencing (</a:t>
+            </a:r>
+            <a:r>
+              <a:rPr lang="el-GR" sz="1600" dirty="0">
+                <a:solidFill>
+                  <a:schemeClr val="bg1"/>
+                </a:solidFill>
+              </a:rPr>
+              <a:t>Δ</a:t>
+            </a:r>
+            <a:r>
+              <a:rPr lang="en-IN" sz="1600" dirty="0">
+                <a:solidFill>
+                  <a:schemeClr val="bg1"/>
+                </a:solidFill>
+              </a:rPr>
+              <a:t>NDVI)</a:t>
+            </a:r>
+            <a:br>
+              <a:rPr lang="en-IN" sz="1600" dirty="0">
+                <a:solidFill>
+                  <a:schemeClr val="bg1"/>
+                </a:solidFill>
+              </a:rPr>
+            </a:br>
+            <a:r>
+              <a:rPr lang="en-IN" sz="1600" dirty="0">
+                <a:solidFill>
+                  <a:schemeClr val="bg1"/>
+                </a:solidFill>
+              </a:rPr>
+              <a:t> • Band-wise Differencing</a:t>
+            </a:r>
+            <a:br>
+              <a:rPr lang="en-IN" sz="1600" dirty="0">
+                <a:solidFill>
+                  <a:schemeClr val="bg1"/>
+                </a:solidFill>
+              </a:rPr>
+            </a:br>
+            <a:r>
+              <a:rPr lang="en-IN" sz="1600" dirty="0">
+                <a:solidFill>
+                  <a:schemeClr val="bg1"/>
+                </a:solidFill>
+              </a:rPr>
+              <a:t> • Optional: K-Means Clustering (scikit-learn)</a:t>
+            </a:r>
+          </a:p>
+          <a:p>
+            <a:r>
+              <a:rPr lang="en-IN" sz="1600" dirty="0">
+                <a:solidFill>
+                  <a:schemeClr val="bg1"/>
+                </a:solidFill>
+              </a:rPr>
+              <a:t>5. Thresholding &amp; Filtering</a:t>
+            </a:r>
+            <a:br>
+              <a:rPr lang="en-IN" sz="1600" dirty="0">
+                <a:solidFill>
+                  <a:schemeClr val="bg1"/>
+                </a:solidFill>
+              </a:rPr>
+            </a:br>
+            <a:r>
+              <a:rPr lang="en-IN" sz="1600" dirty="0">
+                <a:solidFill>
+                  <a:schemeClr val="bg1"/>
+                </a:solidFill>
+              </a:rPr>
+              <a:t> • User-defined threshold (30%–90%)</a:t>
+            </a:r>
+            <a:br>
+              <a:rPr lang="en-IN" sz="1600" dirty="0">
+                <a:solidFill>
+                  <a:schemeClr val="bg1"/>
+                </a:solidFill>
+              </a:rPr>
+            </a:br>
+            <a:r>
+              <a:rPr lang="en-IN" sz="1600" dirty="0">
+                <a:solidFill>
+                  <a:schemeClr val="bg1"/>
+                </a:solidFill>
+              </a:rPr>
+              <a:t> • Noise removal via morphological filtering</a:t>
+            </a:r>
+          </a:p>
+        </p:txBody>
+      </p:sp>
+      <p:sp>
+        <p:nvSpPr>
+          <p:cNvPr id="37" name="Rectangle 36">
+            <a:extLst>
+              <a:ext uri="{FF2B5EF4-FFF2-40B4-BE49-F238E27FC236}">
+                <a16:creationId xmlns:a16="http://schemas.microsoft.com/office/drawing/2014/main" id="{FC135C1D-7386-CD7B-CCB6-D571B7ED5A10}"/>
+              </a:ext>
+            </a:extLst>
+          </p:cNvPr>
+          <p:cNvSpPr/>
+          <p:nvPr/>
+        </p:nvSpPr>
+        <p:spPr>
+          <a:xfrm>
+            <a:off x="2260992" y="4560318"/>
+            <a:ext cx="3550650" cy="1476000"/>
+          </a:xfrm>
+          <a:prstGeom prst="rect">
+            <a:avLst/>
+          </a:prstGeom>
+          <a:ln w="19050"/>
+        </p:spPr>
+        <p:style>
+          <a:lnRef idx="2">
+            <a:schemeClr val="accent6"/>
+          </a:lnRef>
+          <a:fillRef idx="1">
+            <a:schemeClr val="lt1"/>
+          </a:fillRef>
+          <a:effectRef idx="0">
+            <a:schemeClr val="accent6"/>
+          </a:effectRef>
+          <a:fontRef idx="minor">
+            <a:schemeClr val="dk1"/>
+          </a:fontRef>
+        </p:style>
+        <p:txBody>
+          <a:bodyPr rtlCol="0" anchor="ctr"/>
+          <a:lstStyle/>
+          <a:p>
+            <a:pPr algn="ctr"/>
+            <a:r>
+              <a:rPr lang="en-IN" sz="2000" dirty="0">
+                <a:latin typeface="Times New Roman" panose="02020603050405020304" pitchFamily="18" charset="0"/>
+                <a:cs typeface="Times New Roman" panose="02020603050405020304" pitchFamily="18" charset="0"/>
+              </a:rPr>
+              <a:t>Datasets and APIs: NOAA </a:t>
+            </a:r>
+          </a:p>
+          <a:p>
+            <a:pPr algn="ctr"/>
+            <a:r>
+              <a:rPr lang="en-US" sz="2000" dirty="0">
+                <a:latin typeface="Times New Roman" panose="02020603050405020304" pitchFamily="18" charset="0"/>
+                <a:cs typeface="Times New Roman" panose="02020603050405020304" pitchFamily="18" charset="0"/>
+                <a:hlinkClick r:id="rId11"/>
+              </a:rPr>
+              <a:t>Ocean &amp; Coasts | National Oceanic and Atmospheric Administration</a:t>
+            </a:r>
+            <a:endParaRPr lang="en-IN" sz="2000" dirty="0">
+              <a:latin typeface="Times New Roman" panose="02020603050405020304" pitchFamily="18" charset="0"/>
+              <a:cs typeface="Times New Roman" panose="02020603050405020304" pitchFamily="18" charset="0"/>
+            </a:endParaRPr>
           </a:p>
         </p:txBody>
       </p:sp>
     </p:spTree>
     <p:extLst>
       <p:ext uri="{BB962C8B-B14F-4D97-AF65-F5344CB8AC3E}">
-        <p14:creationId xmlns:p14="http://schemas.microsoft.com/office/powerpoint/2010/main" val="1850768898"/>
+        <p14:creationId xmlns:p14="http://schemas.microsoft.com/office/powerpoint/2010/main" val="1565716515"/>
       </p:ext>
     </p:extLst>
   </p:cSld>
@@ -14163,6 +15653,15 @@
 </file>
 
 <file path=customXml/item1.xml><?xml version="1.0" encoding="utf-8"?>
+<?mso-contentType ?>
+<FormTemplates xmlns="http://schemas.microsoft.com/sharepoint/v3/contenttype/forms">
+  <Display>DocumentLibraryForm</Display>
+  <Edit>DocumentLibraryForm</Edit>
+  <New>DocumentLibraryForm</New>
+</FormTemplates>
+</file>
+
+<file path=customXml/item2.xml><?xml version="1.0" encoding="utf-8"?>
 <p:properties xmlns:p="http://schemas.microsoft.com/office/2006/metadata/properties" xmlns:xsi="http://www.w3.org/2001/XMLSchema-instance" xmlns:pc="http://schemas.microsoft.com/office/infopath/2007/PartnerControls">
   <documentManagement>
     <Background xmlns="71af3243-3dd4-4a8d-8c0d-dd76da1f02a5">false</Background>
@@ -14180,15 +15679,6 @@
     <MediaServiceKeyPoints xmlns="71af3243-3dd4-4a8d-8c0d-dd76da1f02a5" xsi:nil="true"/>
   </documentManagement>
 </p:properties>
-</file>
-
-<file path=customXml/item2.xml><?xml version="1.0" encoding="utf-8"?>
-<?mso-contentType ?>
-<FormTemplates xmlns="http://schemas.microsoft.com/sharepoint/v3/contenttype/forms">
-  <Display>DocumentLibraryForm</Display>
-  <Edit>DocumentLibraryForm</Edit>
-  <New>DocumentLibraryForm</New>
-</FormTemplates>
 </file>
 
 <file path=customXml/item3.xml><?xml version="1.0" encoding="utf-8"?>
@@ -14504,6 +15994,14 @@
 </file>
 
 <file path=customXml/itemProps1.xml><?xml version="1.0" encoding="utf-8"?>
+<ds:datastoreItem xmlns:ds="http://schemas.openxmlformats.org/officeDocument/2006/customXml" ds:itemID="{C21FFAC0-05A2-416A-B06C-C248395482CF}">
+  <ds:schemaRefs>
+    <ds:schemaRef ds:uri="http://schemas.microsoft.com/sharepoint/v3/contenttype/forms"/>
+  </ds:schemaRefs>
+</ds:datastoreItem>
+</file>
+
+<file path=customXml/itemProps2.xml><?xml version="1.0" encoding="utf-8"?>
 <ds:datastoreItem xmlns:ds="http://schemas.openxmlformats.org/officeDocument/2006/customXml" ds:itemID="{4F4B194E-8B30-4377-8C59-ECFB902D2A26}">
   <ds:schemaRefs>
     <ds:schemaRef ds:uri="http://schemas.microsoft.com/office/2006/metadata/properties"/>
@@ -14511,14 +16009,6 @@
     <ds:schemaRef ds:uri="71af3243-3dd4-4a8d-8c0d-dd76da1f02a5"/>
     <ds:schemaRef ds:uri="http://schemas.microsoft.com/sharepoint/v3"/>
     <ds:schemaRef ds:uri="230e9df3-be65-4c73-a93b-d1236ebd677e"/>
-  </ds:schemaRefs>
-</ds:datastoreItem>
-</file>
-
-<file path=customXml/itemProps2.xml><?xml version="1.0" encoding="utf-8"?>
-<ds:datastoreItem xmlns:ds="http://schemas.openxmlformats.org/officeDocument/2006/customXml" ds:itemID="{C21FFAC0-05A2-416A-B06C-C248395482CF}">
-  <ds:schemaRefs>
-    <ds:schemaRef ds:uri="http://schemas.microsoft.com/sharepoint/v3/contenttype/forms"/>
   </ds:schemaRefs>
 </ds:datastoreItem>
 </file>

</xml_diff>